<commit_message>
ODP format for presentation
</commit_message>
<xml_diff>
--- a/DeNetAPython.pptx
+++ b/DeNetAPython.pptx
@@ -806,12 +806,6 @@
           <a:bodyPr/>
           <a:lstStyle/>
           <a:p>
-            <a:r>
-              <a:rPr lang="es-ES" dirty="0"/>
-              <a:t> </a:t>
-            </a:r>
-          </a:p>
-          <a:p>
             <a:endParaRPr lang="es-ES" dirty="0">
               <a:cs typeface="Calibri"/>
             </a:endParaRPr>
@@ -898,20 +892,6 @@
           <a:bodyPr/>
           <a:lstStyle/>
           <a:p>
-            <a:r>
-              <a:rPr lang="es-ES">
-                <a:cs typeface="Calibri"/>
-              </a:rPr>
-              <a:t>.</a:t>
-            </a:r>
-            <a:r>
-              <a:rPr lang="es-ES" dirty="0">
-                <a:cs typeface="Calibri"/>
-              </a:rPr>
-              <a:t> </a:t>
-            </a:r>
-          </a:p>
-          <a:p>
             <a:endParaRPr lang="es-ES" dirty="0">
               <a:cs typeface="Calibri"/>
             </a:endParaRPr>
@@ -1098,11 +1078,6 @@
               <a:cs typeface="Calibri"/>
             </a:endParaRPr>
           </a:p>
-          <a:p>
-            <a:endParaRPr lang="es-ES" dirty="0">
-              <a:cs typeface="Calibri"/>
-            </a:endParaRPr>
-          </a:p>
         </p:txBody>
       </p:sp>
       <p:sp>
@@ -2307,11 +2282,6 @@
         <p:txBody>
           <a:bodyPr/>
           <a:lstStyle/>
-          <a:p>
-            <a:endParaRPr lang="es-ES" dirty="0">
-              <a:cs typeface="Calibri"/>
-            </a:endParaRPr>
-          </a:p>
           <a:p>
             <a:endParaRPr lang="es-ES" dirty="0">
               <a:cs typeface="Calibri"/>
@@ -5996,12 +5966,14 @@
             <a:avLst/>
           </a:prstGeom>
           <a:solidFill>
-            <a:srgbClr val="C40000"/>
+            <a:srgbClr val="8E0000"/>
           </a:solidFill>
           <a:ln>
             <a:noFill/>
           </a:ln>
-          <a:effectLst/>
+          <a:effectLst>
+            <a:softEdge rad="25400"/>
+          </a:effectLst>
         </p:spPr>
         <p:style>
           <a:lnRef idx="1">
@@ -6058,12 +6030,14 @@
             <a:avLst/>
           </a:prstGeom>
           <a:solidFill>
-            <a:srgbClr val="C40000"/>
+            <a:srgbClr val="8E0000"/>
           </a:solidFill>
           <a:ln>
             <a:noFill/>
           </a:ln>
-          <a:effectLst/>
+          <a:effectLst>
+            <a:softEdge rad="25400"/>
+          </a:effectLst>
         </p:spPr>
         <p:style>
           <a:lnRef idx="1">
@@ -6117,6 +6091,9 @@
           <a:solidFill>
             <a:srgbClr val="294983"/>
           </a:solidFill>
+          <a:effectLst>
+            <a:softEdge rad="25400"/>
+          </a:effectLst>
         </p:spPr>
         <p:style>
           <a:lnRef idx="2">
@@ -6206,7 +6183,9 @@
           <a:ln>
             <a:noFill/>
           </a:ln>
-          <a:effectLst/>
+          <a:effectLst>
+            <a:softEdge rad="25400"/>
+          </a:effectLst>
         </p:spPr>
         <p:style>
           <a:lnRef idx="2">
@@ -6268,6 +6247,7 @@
                 <a:alpha val="40000"/>
               </a:schemeClr>
             </a:glow>
+            <a:softEdge rad="25400"/>
           </a:effectLst>
         </p:spPr>
         <p:style>
@@ -6290,13 +6270,18 @@
           <a:p>
             <a:pPr algn="ctr"/>
             <a:r>
-              <a:rPr lang="es-ES" dirty="0">
+              <a:rPr lang="es-ES">
                 <a:solidFill>
                   <a:schemeClr val="bg1"/>
                 </a:solidFill>
               </a:rPr>
               <a:t>Contratos API y validaciones</a:t>
             </a:r>
+            <a:endParaRPr lang="es-ES" dirty="0">
+              <a:solidFill>
+                <a:schemeClr val="bg1"/>
+              </a:solidFill>
+            </a:endParaRPr>
           </a:p>
         </p:txBody>
       </p:sp>
@@ -6321,12 +6306,14 @@
             <a:avLst/>
           </a:prstGeom>
           <a:solidFill>
-            <a:srgbClr val="C40000"/>
+            <a:srgbClr val="8E0000"/>
           </a:solidFill>
           <a:ln>
             <a:noFill/>
           </a:ln>
-          <a:effectLst/>
+          <a:effectLst>
+            <a:softEdge rad="25400"/>
+          </a:effectLst>
         </p:spPr>
         <p:style>
           <a:lnRef idx="1">
@@ -6388,233 +6375,8 @@
           <a:ln>
             <a:noFill/>
           </a:ln>
-          <a:effectLst/>
-        </p:spPr>
-        <p:style>
-          <a:lnRef idx="2">
-            <a:schemeClr val="accent1">
-              <a:shade val="50000"/>
-            </a:schemeClr>
-          </a:lnRef>
-          <a:fillRef idx="1">
-            <a:schemeClr val="accent1"/>
-          </a:fillRef>
-          <a:effectRef idx="0">
-            <a:schemeClr val="accent1"/>
-          </a:effectRef>
-          <a:fontRef idx="minor">
-            <a:schemeClr val="lt1"/>
-          </a:fontRef>
-        </p:style>
-        <p:txBody>
-          <a:bodyPr rtlCol="0" anchor="ctr"/>
-          <a:lstStyle/>
-          <a:p>
-            <a:r>
-              <a:rPr lang="es-ES" dirty="0"/>
-              <a:t> Servicios</a:t>
-            </a:r>
-          </a:p>
-        </p:txBody>
-      </p:sp>
-      <p:sp>
-        <p:nvSpPr>
-          <p:cNvPr id="53" name="Rectángulo 52">
-            <a:extLst>
-              <a:ext uri="{FF2B5EF4-FFF2-40B4-BE49-F238E27FC236}">
-                <a16:creationId xmlns:a16="http://schemas.microsoft.com/office/drawing/2014/main" id="{E28442C2-5193-4CC3-89B9-BEFE5C79D7E3}"/>
-              </a:ext>
-            </a:extLst>
-          </p:cNvPr>
-          <p:cNvSpPr/>
-          <p:nvPr/>
-        </p:nvSpPr>
-        <p:spPr>
-          <a:xfrm>
-            <a:off x="335909" y="5580286"/>
-            <a:ext cx="5034382" cy="1064378"/>
-          </a:xfrm>
-          <a:prstGeom prst="rect">
-            <a:avLst/>
-          </a:prstGeom>
-          <a:solidFill>
-            <a:schemeClr val="tx1"/>
-          </a:solidFill>
-          <a:ln>
-            <a:noFill/>
-          </a:ln>
-          <a:effectLst/>
-        </p:spPr>
-        <p:style>
-          <a:lnRef idx="2">
-            <a:schemeClr val="accent1">
-              <a:shade val="50000"/>
-            </a:schemeClr>
-          </a:lnRef>
-          <a:fillRef idx="1">
-            <a:schemeClr val="accent1"/>
-          </a:fillRef>
-          <a:effectRef idx="0">
-            <a:schemeClr val="accent1"/>
-          </a:effectRef>
-          <a:fontRef idx="minor">
-            <a:schemeClr val="lt1"/>
-          </a:fontRef>
-        </p:style>
-        <p:txBody>
-          <a:bodyPr rtlCol="0" anchor="ctr"/>
-          <a:lstStyle/>
-          <a:p>
-            <a:r>
-              <a:rPr lang="en-US" dirty="0" err="1"/>
-              <a:t>Implementación</a:t>
-            </a:r>
-            <a:endParaRPr lang="es-ES" dirty="0"/>
-          </a:p>
-        </p:txBody>
-      </p:sp>
-      <p:sp>
-        <p:nvSpPr>
-          <p:cNvPr id="55" name="Rectángulo 54">
-            <a:extLst>
-              <a:ext uri="{FF2B5EF4-FFF2-40B4-BE49-F238E27FC236}">
-                <a16:creationId xmlns:a16="http://schemas.microsoft.com/office/drawing/2014/main" id="{44856DE2-4E8F-4918-BC1B-D32FD7034FFE}"/>
-              </a:ext>
-            </a:extLst>
-          </p:cNvPr>
-          <p:cNvSpPr/>
-          <p:nvPr/>
-        </p:nvSpPr>
-        <p:spPr>
-          <a:xfrm>
-            <a:off x="334725" y="4920443"/>
-            <a:ext cx="5035566" cy="615774"/>
-          </a:xfrm>
-          <a:prstGeom prst="rect">
-            <a:avLst/>
-          </a:prstGeom>
-          <a:solidFill>
-            <a:schemeClr val="tx1"/>
-          </a:solidFill>
-          <a:ln>
-            <a:noFill/>
-          </a:ln>
-          <a:effectLst/>
-        </p:spPr>
-        <p:style>
-          <a:lnRef idx="2">
-            <a:schemeClr val="accent1">
-              <a:shade val="50000"/>
-            </a:schemeClr>
-          </a:lnRef>
-          <a:fillRef idx="1">
-            <a:schemeClr val="accent1"/>
-          </a:fillRef>
-          <a:effectRef idx="0">
-            <a:schemeClr val="accent1"/>
-          </a:effectRef>
-          <a:fontRef idx="minor">
-            <a:schemeClr val="lt1"/>
-          </a:fontRef>
-        </p:style>
-        <p:txBody>
-          <a:bodyPr rtlCol="0" anchor="ctr"/>
-          <a:lstStyle/>
-          <a:p>
-            <a:r>
-              <a:rPr lang="es-ES" dirty="0"/>
-              <a:t> Modelos</a:t>
-            </a:r>
-          </a:p>
-        </p:txBody>
-      </p:sp>
-      <p:sp>
-        <p:nvSpPr>
-          <p:cNvPr id="58" name="Rectángulo 57">
-            <a:extLst>
-              <a:ext uri="{FF2B5EF4-FFF2-40B4-BE49-F238E27FC236}">
-                <a16:creationId xmlns:a16="http://schemas.microsoft.com/office/drawing/2014/main" id="{21E0D95E-A017-42A2-8F24-778264489AFD}"/>
-              </a:ext>
-            </a:extLst>
-          </p:cNvPr>
-          <p:cNvSpPr/>
-          <p:nvPr/>
-        </p:nvSpPr>
-        <p:spPr>
-          <a:xfrm>
-            <a:off x="6853544" y="1204631"/>
-            <a:ext cx="5022471" cy="804644"/>
-          </a:xfrm>
-          <a:prstGeom prst="rect">
-            <a:avLst/>
-          </a:prstGeom>
-          <a:solidFill>
-            <a:schemeClr val="tx1"/>
-          </a:solidFill>
-          <a:ln>
-            <a:noFill/>
-          </a:ln>
-          <a:effectLst/>
-        </p:spPr>
-        <p:style>
-          <a:lnRef idx="2">
-            <a:schemeClr val="accent1">
-              <a:shade val="50000"/>
-            </a:schemeClr>
-          </a:lnRef>
-          <a:fillRef idx="1">
-            <a:schemeClr val="accent1"/>
-          </a:fillRef>
-          <a:effectRef idx="0">
-            <a:schemeClr val="accent1"/>
-          </a:effectRef>
-          <a:fontRef idx="minor">
-            <a:schemeClr val="lt1"/>
-          </a:fontRef>
-        </p:style>
-        <p:txBody>
-          <a:bodyPr rtlCol="0" anchor="ctr"/>
-          <a:lstStyle/>
-          <a:p>
-            <a:r>
-              <a:rPr lang="es-ES" dirty="0"/>
-              <a:t>  </a:t>
-            </a:r>
-            <a:r>
-              <a:rPr lang="es-ES" dirty="0" err="1"/>
-              <a:t>Template</a:t>
-            </a:r>
-            <a:endParaRPr lang="es-ES" dirty="0"/>
-          </a:p>
-        </p:txBody>
-      </p:sp>
-      <p:sp>
-        <p:nvSpPr>
-          <p:cNvPr id="59" name="Rectángulo 58">
-            <a:extLst>
-              <a:ext uri="{FF2B5EF4-FFF2-40B4-BE49-F238E27FC236}">
-                <a16:creationId xmlns:a16="http://schemas.microsoft.com/office/drawing/2014/main" id="{0A77F683-D1C0-4806-8275-386507FCC68D}"/>
-              </a:ext>
-            </a:extLst>
-          </p:cNvPr>
-          <p:cNvSpPr/>
-          <p:nvPr/>
-        </p:nvSpPr>
-        <p:spPr>
-          <a:xfrm>
-            <a:off x="8399577" y="1338543"/>
-            <a:ext cx="3246989" cy="553660"/>
-          </a:xfrm>
-          <a:prstGeom prst="rect">
-            <a:avLst/>
-          </a:prstGeom>
           <a:effectLst>
-            <a:glow rad="139700">
-              <a:schemeClr val="accent3">
-                <a:satMod val="175000"/>
-                <a:alpha val="40000"/>
-              </a:schemeClr>
-            </a:glow>
+            <a:softEdge rad="25400"/>
           </a:effectLst>
         </p:spPr>
         <p:style>
@@ -6637,24 +6399,19 @@
           <a:bodyPr rtlCol="0" anchor="ctr"/>
           <a:lstStyle/>
           <a:p>
-            <a:pPr algn="ctr"/>
-            <a:r>
-              <a:rPr lang="es-ES" dirty="0" err="1"/>
-              <a:t>Serializers</a:t>
-            </a:r>
             <a:r>
               <a:rPr lang="es-ES" dirty="0"/>
-              <a:t> (Contratos Modelo y validaciones)</a:t>
-            </a:r>
-          </a:p>
-        </p:txBody>
-      </p:sp>
-      <p:sp>
-        <p:nvSpPr>
-          <p:cNvPr id="60" name="Rectángulo 59">
-            <a:extLst>
-              <a:ext uri="{FF2B5EF4-FFF2-40B4-BE49-F238E27FC236}">
-                <a16:creationId xmlns:a16="http://schemas.microsoft.com/office/drawing/2014/main" id="{5DAC0906-AAE2-48D6-9408-516D24FFE5AE}"/>
+              <a:t> Servicios</a:t>
+            </a:r>
+          </a:p>
+        </p:txBody>
+      </p:sp>
+      <p:sp>
+        <p:nvSpPr>
+          <p:cNvPr id="53" name="Rectángulo 52">
+            <a:extLst>
+              <a:ext uri="{FF2B5EF4-FFF2-40B4-BE49-F238E27FC236}">
+                <a16:creationId xmlns:a16="http://schemas.microsoft.com/office/drawing/2014/main" id="{E28442C2-5193-4CC3-89B9-BEFE5C79D7E3}"/>
               </a:ext>
             </a:extLst>
           </p:cNvPr>
@@ -6663,8 +6420,8 @@
         </p:nvSpPr>
         <p:spPr>
           <a:xfrm>
-            <a:off x="6880310" y="2082858"/>
-            <a:ext cx="5022471" cy="1283026"/>
+            <a:off x="335909" y="5580286"/>
+            <a:ext cx="5034382" cy="1064378"/>
           </a:xfrm>
           <a:prstGeom prst="rect">
             <a:avLst/>
@@ -6675,62 +6432,8 @@
           <a:ln>
             <a:noFill/>
           </a:ln>
-          <a:effectLst/>
-        </p:spPr>
-        <p:style>
-          <a:lnRef idx="2">
-            <a:schemeClr val="accent1">
-              <a:shade val="50000"/>
-            </a:schemeClr>
-          </a:lnRef>
-          <a:fillRef idx="1">
-            <a:schemeClr val="accent1"/>
-          </a:fillRef>
-          <a:effectRef idx="0">
-            <a:schemeClr val="accent1"/>
-          </a:effectRef>
-          <a:fontRef idx="minor">
-            <a:schemeClr val="lt1"/>
-          </a:fontRef>
-        </p:style>
-        <p:txBody>
-          <a:bodyPr rtlCol="0" anchor="ctr"/>
-          <a:lstStyle/>
-          <a:p>
-            <a:r>
-              <a:rPr lang="es-ES" dirty="0"/>
-              <a:t>  View</a:t>
-            </a:r>
-          </a:p>
-        </p:txBody>
-      </p:sp>
-      <p:sp>
-        <p:nvSpPr>
-          <p:cNvPr id="62" name="Rectángulo 61">
-            <a:extLst>
-              <a:ext uri="{FF2B5EF4-FFF2-40B4-BE49-F238E27FC236}">
-                <a16:creationId xmlns:a16="http://schemas.microsoft.com/office/drawing/2014/main" id="{76765935-24DB-44C9-A953-FAE9D7E4E69B}"/>
-              </a:ext>
-            </a:extLst>
-          </p:cNvPr>
-          <p:cNvSpPr/>
-          <p:nvPr/>
-        </p:nvSpPr>
-        <p:spPr>
-          <a:xfrm>
-            <a:off x="8399577" y="2797964"/>
-            <a:ext cx="3246989" cy="361632"/>
-          </a:xfrm>
-          <a:prstGeom prst="rect">
-            <a:avLst/>
-          </a:prstGeom>
           <a:effectLst>
-            <a:glow rad="139700">
-              <a:schemeClr val="accent3">
-                <a:satMod val="175000"/>
-                <a:alpha val="40000"/>
-              </a:schemeClr>
-            </a:glow>
+            <a:softEdge rad="25400"/>
           </a:effectLst>
         </p:spPr>
         <p:style>
@@ -6753,20 +6456,20 @@
           <a:bodyPr rtlCol="0" anchor="ctr"/>
           <a:lstStyle/>
           <a:p>
-            <a:pPr algn="ctr"/>
-            <a:r>
-              <a:rPr lang="es-ES" dirty="0"/>
-              <a:t>Contratos (verbos)</a:t>
-            </a:r>
-          </a:p>
-        </p:txBody>
-      </p:sp>
-      <p:sp>
-        <p:nvSpPr>
-          <p:cNvPr id="63" name="Rectángulo 62">
-            <a:extLst>
-              <a:ext uri="{FF2B5EF4-FFF2-40B4-BE49-F238E27FC236}">
-                <a16:creationId xmlns:a16="http://schemas.microsoft.com/office/drawing/2014/main" id="{F2C68A42-4CF0-48D8-BE74-00365F4B8B1C}"/>
+            <a:r>
+              <a:rPr lang="en-US"/>
+              <a:t>Implementación</a:t>
+            </a:r>
+            <a:endParaRPr lang="es-ES" dirty="0"/>
+          </a:p>
+        </p:txBody>
+      </p:sp>
+      <p:sp>
+        <p:nvSpPr>
+          <p:cNvPr id="55" name="Rectángulo 54">
+            <a:extLst>
+              <a:ext uri="{FF2B5EF4-FFF2-40B4-BE49-F238E27FC236}">
+                <a16:creationId xmlns:a16="http://schemas.microsoft.com/office/drawing/2014/main" id="{44856DE2-4E8F-4918-BC1B-D32FD7034FFE}"/>
               </a:ext>
             </a:extLst>
           </p:cNvPr>
@@ -6775,8 +6478,8 @@
         </p:nvSpPr>
         <p:spPr>
           <a:xfrm>
-            <a:off x="6865576" y="3452461"/>
-            <a:ext cx="5022471" cy="1200163"/>
+            <a:off x="334725" y="4920443"/>
+            <a:ext cx="5035566" cy="615774"/>
           </a:xfrm>
           <a:prstGeom prst="rect">
             <a:avLst/>
@@ -6787,7 +6490,9 @@
           <a:ln>
             <a:noFill/>
           </a:ln>
-          <a:effectLst/>
+          <a:effectLst>
+            <a:softEdge rad="25400"/>
+          </a:effectLst>
         </p:spPr>
         <p:style>
           <a:lnRef idx="2">
@@ -6811,6 +6516,302 @@
           <a:p>
             <a:r>
               <a:rPr lang="es-ES" dirty="0"/>
+              <a:t> Modelos</a:t>
+            </a:r>
+          </a:p>
+        </p:txBody>
+      </p:sp>
+      <p:sp>
+        <p:nvSpPr>
+          <p:cNvPr id="58" name="Rectángulo 57">
+            <a:extLst>
+              <a:ext uri="{FF2B5EF4-FFF2-40B4-BE49-F238E27FC236}">
+                <a16:creationId xmlns:a16="http://schemas.microsoft.com/office/drawing/2014/main" id="{21E0D95E-A017-42A2-8F24-778264489AFD}"/>
+              </a:ext>
+            </a:extLst>
+          </p:cNvPr>
+          <p:cNvSpPr/>
+          <p:nvPr/>
+        </p:nvSpPr>
+        <p:spPr>
+          <a:xfrm>
+            <a:off x="6853544" y="1204631"/>
+            <a:ext cx="5022471" cy="804644"/>
+          </a:xfrm>
+          <a:prstGeom prst="rect">
+            <a:avLst/>
+          </a:prstGeom>
+          <a:solidFill>
+            <a:schemeClr val="tx1"/>
+          </a:solidFill>
+          <a:ln>
+            <a:noFill/>
+          </a:ln>
+          <a:effectLst>
+            <a:softEdge rad="25400"/>
+          </a:effectLst>
+        </p:spPr>
+        <p:style>
+          <a:lnRef idx="2">
+            <a:schemeClr val="accent1">
+              <a:shade val="50000"/>
+            </a:schemeClr>
+          </a:lnRef>
+          <a:fillRef idx="1">
+            <a:schemeClr val="accent1"/>
+          </a:fillRef>
+          <a:effectRef idx="0">
+            <a:schemeClr val="accent1"/>
+          </a:effectRef>
+          <a:fontRef idx="minor">
+            <a:schemeClr val="lt1"/>
+          </a:fontRef>
+        </p:style>
+        <p:txBody>
+          <a:bodyPr rtlCol="0" anchor="ctr"/>
+          <a:lstStyle/>
+          <a:p>
+            <a:r>
+              <a:rPr lang="es-ES" dirty="0"/>
+              <a:t>  </a:t>
+            </a:r>
+            <a:r>
+              <a:rPr lang="es-ES" dirty="0" err="1"/>
+              <a:t>Template</a:t>
+            </a:r>
+            <a:endParaRPr lang="es-ES" dirty="0"/>
+          </a:p>
+        </p:txBody>
+      </p:sp>
+      <p:sp>
+        <p:nvSpPr>
+          <p:cNvPr id="59" name="Rectángulo 58">
+            <a:extLst>
+              <a:ext uri="{FF2B5EF4-FFF2-40B4-BE49-F238E27FC236}">
+                <a16:creationId xmlns:a16="http://schemas.microsoft.com/office/drawing/2014/main" id="{0A77F683-D1C0-4806-8275-386507FCC68D}"/>
+              </a:ext>
+            </a:extLst>
+          </p:cNvPr>
+          <p:cNvSpPr/>
+          <p:nvPr/>
+        </p:nvSpPr>
+        <p:spPr>
+          <a:xfrm>
+            <a:off x="8399577" y="1338543"/>
+            <a:ext cx="3246989" cy="553660"/>
+          </a:xfrm>
+          <a:prstGeom prst="rect">
+            <a:avLst/>
+          </a:prstGeom>
+          <a:effectLst>
+            <a:glow rad="139700">
+              <a:schemeClr val="accent3">
+                <a:satMod val="175000"/>
+                <a:alpha val="40000"/>
+              </a:schemeClr>
+            </a:glow>
+            <a:softEdge rad="25400"/>
+          </a:effectLst>
+        </p:spPr>
+        <p:style>
+          <a:lnRef idx="2">
+            <a:schemeClr val="accent1">
+              <a:shade val="50000"/>
+            </a:schemeClr>
+          </a:lnRef>
+          <a:fillRef idx="1">
+            <a:schemeClr val="accent1"/>
+          </a:fillRef>
+          <a:effectRef idx="0">
+            <a:schemeClr val="accent1"/>
+          </a:effectRef>
+          <a:fontRef idx="minor">
+            <a:schemeClr val="lt1"/>
+          </a:fontRef>
+        </p:style>
+        <p:txBody>
+          <a:bodyPr rtlCol="0" anchor="ctr"/>
+          <a:lstStyle/>
+          <a:p>
+            <a:pPr algn="ctr"/>
+            <a:r>
+              <a:rPr lang="es-ES" dirty="0" err="1"/>
+              <a:t>Serializers</a:t>
+            </a:r>
+            <a:r>
+              <a:rPr lang="es-ES" dirty="0"/>
+              <a:t> (Contratos Modelo y validaciones)</a:t>
+            </a:r>
+          </a:p>
+        </p:txBody>
+      </p:sp>
+      <p:sp>
+        <p:nvSpPr>
+          <p:cNvPr id="60" name="Rectángulo 59">
+            <a:extLst>
+              <a:ext uri="{FF2B5EF4-FFF2-40B4-BE49-F238E27FC236}">
+                <a16:creationId xmlns:a16="http://schemas.microsoft.com/office/drawing/2014/main" id="{5DAC0906-AAE2-48D6-9408-516D24FFE5AE}"/>
+              </a:ext>
+            </a:extLst>
+          </p:cNvPr>
+          <p:cNvSpPr/>
+          <p:nvPr/>
+        </p:nvSpPr>
+        <p:spPr>
+          <a:xfrm>
+            <a:off x="6880310" y="2082858"/>
+            <a:ext cx="5022471" cy="1283026"/>
+          </a:xfrm>
+          <a:prstGeom prst="rect">
+            <a:avLst/>
+          </a:prstGeom>
+          <a:solidFill>
+            <a:schemeClr val="tx1"/>
+          </a:solidFill>
+          <a:ln>
+            <a:noFill/>
+          </a:ln>
+          <a:effectLst>
+            <a:softEdge rad="25400"/>
+          </a:effectLst>
+        </p:spPr>
+        <p:style>
+          <a:lnRef idx="2">
+            <a:schemeClr val="accent1">
+              <a:shade val="50000"/>
+            </a:schemeClr>
+          </a:lnRef>
+          <a:fillRef idx="1">
+            <a:schemeClr val="accent1"/>
+          </a:fillRef>
+          <a:effectRef idx="0">
+            <a:schemeClr val="accent1"/>
+          </a:effectRef>
+          <a:fontRef idx="minor">
+            <a:schemeClr val="lt1"/>
+          </a:fontRef>
+        </p:style>
+        <p:txBody>
+          <a:bodyPr rtlCol="0" anchor="ctr"/>
+          <a:lstStyle/>
+          <a:p>
+            <a:r>
+              <a:rPr lang="es-ES" dirty="0"/>
+              <a:t>  View</a:t>
+            </a:r>
+          </a:p>
+        </p:txBody>
+      </p:sp>
+      <p:sp>
+        <p:nvSpPr>
+          <p:cNvPr id="62" name="Rectángulo 61">
+            <a:extLst>
+              <a:ext uri="{FF2B5EF4-FFF2-40B4-BE49-F238E27FC236}">
+                <a16:creationId xmlns:a16="http://schemas.microsoft.com/office/drawing/2014/main" id="{76765935-24DB-44C9-A953-FAE9D7E4E69B}"/>
+              </a:ext>
+            </a:extLst>
+          </p:cNvPr>
+          <p:cNvSpPr/>
+          <p:nvPr/>
+        </p:nvSpPr>
+        <p:spPr>
+          <a:xfrm>
+            <a:off x="8399577" y="2797964"/>
+            <a:ext cx="3246989" cy="361632"/>
+          </a:xfrm>
+          <a:prstGeom prst="rect">
+            <a:avLst/>
+          </a:prstGeom>
+          <a:effectLst>
+            <a:glow rad="139700">
+              <a:schemeClr val="accent3">
+                <a:satMod val="175000"/>
+                <a:alpha val="40000"/>
+              </a:schemeClr>
+            </a:glow>
+            <a:softEdge rad="25400"/>
+          </a:effectLst>
+        </p:spPr>
+        <p:style>
+          <a:lnRef idx="2">
+            <a:schemeClr val="accent1">
+              <a:shade val="50000"/>
+            </a:schemeClr>
+          </a:lnRef>
+          <a:fillRef idx="1">
+            <a:schemeClr val="accent1"/>
+          </a:fillRef>
+          <a:effectRef idx="0">
+            <a:schemeClr val="accent1"/>
+          </a:effectRef>
+          <a:fontRef idx="minor">
+            <a:schemeClr val="lt1"/>
+          </a:fontRef>
+        </p:style>
+        <p:txBody>
+          <a:bodyPr rtlCol="0" anchor="ctr"/>
+          <a:lstStyle/>
+          <a:p>
+            <a:pPr algn="ctr"/>
+            <a:r>
+              <a:rPr lang="es-ES" dirty="0"/>
+              <a:t>Contratos (verbos)</a:t>
+            </a:r>
+          </a:p>
+        </p:txBody>
+      </p:sp>
+      <p:sp>
+        <p:nvSpPr>
+          <p:cNvPr id="63" name="Rectángulo 62">
+            <a:extLst>
+              <a:ext uri="{FF2B5EF4-FFF2-40B4-BE49-F238E27FC236}">
+                <a16:creationId xmlns:a16="http://schemas.microsoft.com/office/drawing/2014/main" id="{F2C68A42-4CF0-48D8-BE74-00365F4B8B1C}"/>
+              </a:ext>
+            </a:extLst>
+          </p:cNvPr>
+          <p:cNvSpPr/>
+          <p:nvPr/>
+        </p:nvSpPr>
+        <p:spPr>
+          <a:xfrm>
+            <a:off x="6865576" y="3452461"/>
+            <a:ext cx="5022471" cy="1200163"/>
+          </a:xfrm>
+          <a:prstGeom prst="rect">
+            <a:avLst/>
+          </a:prstGeom>
+          <a:solidFill>
+            <a:schemeClr val="tx1"/>
+          </a:solidFill>
+          <a:ln>
+            <a:noFill/>
+          </a:ln>
+          <a:effectLst>
+            <a:softEdge rad="25400"/>
+          </a:effectLst>
+        </p:spPr>
+        <p:style>
+          <a:lnRef idx="2">
+            <a:schemeClr val="accent1">
+              <a:shade val="50000"/>
+            </a:schemeClr>
+          </a:lnRef>
+          <a:fillRef idx="1">
+            <a:schemeClr val="accent1"/>
+          </a:fillRef>
+          <a:effectRef idx="0">
+            <a:schemeClr val="accent1"/>
+          </a:effectRef>
+          <a:fontRef idx="minor">
+            <a:schemeClr val="lt1"/>
+          </a:fontRef>
+        </p:style>
+        <p:txBody>
+          <a:bodyPr rtlCol="0" anchor="ctr"/>
+          <a:lstStyle/>
+          <a:p>
+            <a:r>
+              <a:rPr lang="es-ES" dirty="0"/>
               <a:t>  </a:t>
             </a:r>
             <a:r>
@@ -6848,6 +6849,7 @@
                 <a:alpha val="40000"/>
               </a:schemeClr>
             </a:glow>
+            <a:softEdge rad="25400"/>
           </a:effectLst>
         </p:spPr>
         <p:style>
@@ -7107,12 +7109,14 @@
             <a:avLst/>
           </a:prstGeom>
           <a:solidFill>
-            <a:srgbClr val="C40000"/>
+            <a:srgbClr val="8E0000"/>
           </a:solidFill>
           <a:ln>
             <a:noFill/>
           </a:ln>
-          <a:effectLst/>
+          <a:effectLst>
+            <a:softEdge rad="25400"/>
+          </a:effectLst>
         </p:spPr>
         <p:style>
           <a:lnRef idx="1">
@@ -7169,12 +7173,14 @@
             <a:avLst/>
           </a:prstGeom>
           <a:solidFill>
-            <a:srgbClr val="C40000"/>
+            <a:srgbClr val="8E0000"/>
           </a:solidFill>
           <a:ln>
             <a:noFill/>
           </a:ln>
-          <a:effectLst/>
+          <a:effectLst>
+            <a:softEdge rad="25400"/>
+          </a:effectLst>
         </p:spPr>
         <p:style>
           <a:lnRef idx="1">
@@ -7228,6 +7234,9 @@
           <a:solidFill>
             <a:srgbClr val="294983"/>
           </a:solidFill>
+          <a:effectLst>
+            <a:softEdge rad="25400"/>
+          </a:effectLst>
         </p:spPr>
         <p:style>
           <a:lnRef idx="2">
@@ -7317,7 +7326,9 @@
           <a:ln>
             <a:noFill/>
           </a:ln>
-          <a:effectLst/>
+          <a:effectLst>
+            <a:softEdge rad="25400"/>
+          </a:effectLst>
         </p:spPr>
         <p:style>
           <a:lnRef idx="2">
@@ -7379,6 +7390,7 @@
                 <a:alpha val="40000"/>
               </a:schemeClr>
             </a:glow>
+            <a:softEdge rad="25400"/>
           </a:effectLst>
         </p:spPr>
         <p:style>
@@ -7401,13 +7413,18 @@
           <a:p>
             <a:pPr algn="ctr"/>
             <a:r>
-              <a:rPr lang="es-ES" dirty="0">
+              <a:rPr lang="es-ES">
                 <a:solidFill>
                   <a:schemeClr val="bg1"/>
                 </a:solidFill>
               </a:rPr>
               <a:t>DI</a:t>
             </a:r>
+            <a:endParaRPr lang="es-ES" dirty="0">
+              <a:solidFill>
+                <a:schemeClr val="bg1"/>
+              </a:solidFill>
+            </a:endParaRPr>
           </a:p>
         </p:txBody>
       </p:sp>
@@ -7437,7 +7454,9 @@
           <a:ln>
             <a:noFill/>
           </a:ln>
-          <a:effectLst/>
+          <a:effectLst>
+            <a:softEdge rad="25400"/>
+          </a:effectLst>
         </p:spPr>
         <p:style>
           <a:lnRef idx="1">
@@ -7490,12 +7509,14 @@
             <a:avLst/>
           </a:prstGeom>
           <a:solidFill>
-            <a:srgbClr val="C40000"/>
+            <a:srgbClr val="8E0000"/>
           </a:solidFill>
           <a:ln>
             <a:noFill/>
           </a:ln>
-          <a:effectLst/>
+          <a:effectLst>
+            <a:softEdge rad="25400"/>
+          </a:effectLst>
         </p:spPr>
         <p:style>
           <a:lnRef idx="1">
@@ -7557,7 +7578,9 @@
           <a:ln>
             <a:noFill/>
           </a:ln>
-          <a:effectLst/>
+          <a:effectLst>
+            <a:softEdge rad="25400"/>
+          </a:effectLst>
         </p:spPr>
         <p:style>
           <a:lnRef idx="2">
@@ -7580,9 +7603,10 @@
           <a:lstStyle/>
           <a:p>
             <a:r>
-              <a:rPr lang="es-ES" dirty="0"/>
+              <a:rPr lang="es-ES"/>
               <a:t> Servicios</a:t>
             </a:r>
+            <a:endParaRPr lang="es-ES" dirty="0"/>
           </a:p>
         </p:txBody>
       </p:sp>
@@ -7612,7 +7636,9 @@
           <a:ln>
             <a:noFill/>
           </a:ln>
-          <a:effectLst/>
+          <a:effectLst>
+            <a:softEdge rad="25400"/>
+          </a:effectLst>
         </p:spPr>
         <p:style>
           <a:lnRef idx="2">
@@ -7635,7 +7661,7 @@
           <a:lstStyle/>
           <a:p>
             <a:r>
-              <a:rPr lang="en-US" dirty="0" err="1"/>
+              <a:rPr lang="en-US"/>
               <a:t>Implementación</a:t>
             </a:r>
             <a:endParaRPr lang="es-ES" dirty="0"/>
@@ -7668,7 +7694,9 @@
           <a:ln>
             <a:noFill/>
           </a:ln>
-          <a:effectLst/>
+          <a:effectLst>
+            <a:softEdge rad="25400"/>
+          </a:effectLst>
         </p:spPr>
         <p:style>
           <a:lnRef idx="2">
@@ -7691,9 +7719,10 @@
           <a:lstStyle/>
           <a:p>
             <a:r>
-              <a:rPr lang="es-ES" dirty="0"/>
+              <a:rPr lang="es-ES"/>
               <a:t> Modelos</a:t>
             </a:r>
+            <a:endParaRPr lang="es-ES" dirty="0"/>
           </a:p>
         </p:txBody>
       </p:sp>
@@ -7723,7 +7752,9 @@
           <a:ln>
             <a:noFill/>
           </a:ln>
-          <a:effectLst/>
+          <a:effectLst>
+            <a:softEdge rad="25400"/>
+          </a:effectLst>
         </p:spPr>
         <p:style>
           <a:lnRef idx="2">
@@ -7777,6 +7808,9 @@
           <a:prstGeom prst="rect">
             <a:avLst/>
           </a:prstGeom>
+          <a:effectLst>
+            <a:softEdge rad="25400"/>
+          </a:effectLst>
         </p:spPr>
         <p:style>
           <a:lnRef idx="2">
@@ -7836,7 +7870,9 @@
           <a:ln>
             <a:noFill/>
           </a:ln>
-          <a:effectLst/>
+          <a:effectLst>
+            <a:softEdge rad="25400"/>
+          </a:effectLst>
         </p:spPr>
         <p:style>
           <a:lnRef idx="2">
@@ -7885,6 +7921,9 @@
           <a:prstGeom prst="rect">
             <a:avLst/>
           </a:prstGeom>
+          <a:effectLst>
+            <a:softEdge rad="25400"/>
+          </a:effectLst>
         </p:spPr>
         <p:style>
           <a:lnRef idx="2">
@@ -7940,7 +7979,9 @@
           <a:ln>
             <a:noFill/>
           </a:ln>
-          <a:effectLst/>
+          <a:effectLst>
+            <a:softEdge rad="25400"/>
+          </a:effectLst>
         </p:spPr>
         <p:style>
           <a:lnRef idx="2">
@@ -7994,6 +8035,9 @@
           <a:prstGeom prst="rect">
             <a:avLst/>
           </a:prstGeom>
+          <a:effectLst>
+            <a:softEdge rad="25400"/>
+          </a:effectLst>
         </p:spPr>
         <p:style>
           <a:lnRef idx="2">
@@ -8094,12 +8138,14 @@
             <a:avLst/>
           </a:prstGeom>
           <a:solidFill>
-            <a:srgbClr val="C40000"/>
+            <a:srgbClr val="8E0000"/>
           </a:solidFill>
           <a:ln>
             <a:noFill/>
           </a:ln>
-          <a:effectLst/>
+          <a:effectLst>
+            <a:softEdge rad="25400"/>
+          </a:effectLst>
         </p:spPr>
         <p:style>
           <a:lnRef idx="1">
@@ -8156,12 +8202,14 @@
             <a:avLst/>
           </a:prstGeom>
           <a:solidFill>
-            <a:srgbClr val="C40000"/>
+            <a:srgbClr val="8E0000"/>
           </a:solidFill>
           <a:ln>
             <a:noFill/>
           </a:ln>
-          <a:effectLst/>
+          <a:effectLst>
+            <a:softEdge rad="25400"/>
+          </a:effectLst>
         </p:spPr>
         <p:style>
           <a:lnRef idx="1">
@@ -8215,6 +8263,9 @@
           <a:solidFill>
             <a:srgbClr val="294983"/>
           </a:solidFill>
+          <a:effectLst>
+            <a:softEdge rad="25400"/>
+          </a:effectLst>
         </p:spPr>
         <p:style>
           <a:lnRef idx="2">
@@ -8304,7 +8355,9 @@
           <a:ln>
             <a:noFill/>
           </a:ln>
-          <a:effectLst/>
+          <a:effectLst>
+            <a:softEdge rad="25400"/>
+          </a:effectLst>
         </p:spPr>
         <p:style>
           <a:lnRef idx="2">
@@ -8359,7 +8412,9 @@
           <a:ln>
             <a:noFill/>
           </a:ln>
-          <a:effectLst/>
+          <a:effectLst>
+            <a:softEdge rad="25400"/>
+          </a:effectLst>
         </p:spPr>
         <p:style>
           <a:lnRef idx="1">
@@ -8424,6 +8479,7 @@
                 <a:alpha val="40000"/>
               </a:schemeClr>
             </a:glow>
+            <a:softEdge rad="25400"/>
           </a:effectLst>
         </p:spPr>
         <p:style>
@@ -8494,6 +8550,7 @@
                 <a:alpha val="40000"/>
               </a:schemeClr>
             </a:glow>
+            <a:softEdge rad="25400"/>
           </a:effectLst>
         </p:spPr>
         <p:style>
@@ -8552,7 +8609,9 @@
           <a:ln>
             <a:noFill/>
           </a:ln>
-          <a:effectLst/>
+          <a:effectLst>
+            <a:softEdge rad="25400"/>
+          </a:effectLst>
         </p:spPr>
         <p:style>
           <a:lnRef idx="1">
@@ -8605,12 +8664,14 @@
             <a:avLst/>
           </a:prstGeom>
           <a:solidFill>
-            <a:srgbClr val="C40000"/>
+            <a:srgbClr val="8E0000"/>
           </a:solidFill>
           <a:ln>
             <a:noFill/>
           </a:ln>
-          <a:effectLst/>
+          <a:effectLst>
+            <a:softEdge rad="25400"/>
+          </a:effectLst>
         </p:spPr>
         <p:style>
           <a:lnRef idx="1">
@@ -8672,450 +8733,8 @@
           <a:ln>
             <a:noFill/>
           </a:ln>
-          <a:effectLst/>
-        </p:spPr>
-        <p:style>
-          <a:lnRef idx="2">
-            <a:schemeClr val="accent1">
-              <a:shade val="50000"/>
-            </a:schemeClr>
-          </a:lnRef>
-          <a:fillRef idx="1">
-            <a:schemeClr val="accent1"/>
-          </a:fillRef>
-          <a:effectRef idx="0">
-            <a:schemeClr val="accent1"/>
-          </a:effectRef>
-          <a:fontRef idx="minor">
-            <a:schemeClr val="lt1"/>
-          </a:fontRef>
-        </p:style>
-        <p:txBody>
-          <a:bodyPr rtlCol="0" anchor="ctr"/>
-          <a:lstStyle/>
-          <a:p>
-            <a:r>
-              <a:rPr lang="es-ES" dirty="0"/>
-              <a:t> Servicios</a:t>
-            </a:r>
-          </a:p>
-        </p:txBody>
-      </p:sp>
-      <p:sp>
-        <p:nvSpPr>
-          <p:cNvPr id="53" name="Rectángulo 52">
-            <a:extLst>
-              <a:ext uri="{FF2B5EF4-FFF2-40B4-BE49-F238E27FC236}">
-                <a16:creationId xmlns:a16="http://schemas.microsoft.com/office/drawing/2014/main" id="{E28442C2-5193-4CC3-89B9-BEFE5C79D7E3}"/>
-              </a:ext>
-            </a:extLst>
-          </p:cNvPr>
-          <p:cNvSpPr/>
-          <p:nvPr/>
-        </p:nvSpPr>
-        <p:spPr>
-          <a:xfrm>
-            <a:off x="335909" y="5580286"/>
-            <a:ext cx="5034382" cy="1064378"/>
-          </a:xfrm>
-          <a:prstGeom prst="rect">
-            <a:avLst/>
-          </a:prstGeom>
-          <a:solidFill>
-            <a:schemeClr val="tx1"/>
-          </a:solidFill>
-          <a:ln>
-            <a:noFill/>
-          </a:ln>
-          <a:effectLst/>
-        </p:spPr>
-        <p:style>
-          <a:lnRef idx="2">
-            <a:schemeClr val="accent1">
-              <a:shade val="50000"/>
-            </a:schemeClr>
-          </a:lnRef>
-          <a:fillRef idx="1">
-            <a:schemeClr val="accent1"/>
-          </a:fillRef>
-          <a:effectRef idx="0">
-            <a:schemeClr val="accent1"/>
-          </a:effectRef>
-          <a:fontRef idx="minor">
-            <a:schemeClr val="lt1"/>
-          </a:fontRef>
-        </p:style>
-        <p:txBody>
-          <a:bodyPr rtlCol="0" anchor="ctr"/>
-          <a:lstStyle/>
-          <a:p>
-            <a:r>
-              <a:rPr lang="en-US" dirty="0" err="1"/>
-              <a:t>Implementación</a:t>
-            </a:r>
-            <a:endParaRPr lang="es-ES" dirty="0"/>
-          </a:p>
-        </p:txBody>
-      </p:sp>
-      <p:sp>
-        <p:nvSpPr>
-          <p:cNvPr id="55" name="Rectángulo 54">
-            <a:extLst>
-              <a:ext uri="{FF2B5EF4-FFF2-40B4-BE49-F238E27FC236}">
-                <a16:creationId xmlns:a16="http://schemas.microsoft.com/office/drawing/2014/main" id="{44856DE2-4E8F-4918-BC1B-D32FD7034FFE}"/>
-              </a:ext>
-            </a:extLst>
-          </p:cNvPr>
-          <p:cNvSpPr/>
-          <p:nvPr/>
-        </p:nvSpPr>
-        <p:spPr>
-          <a:xfrm>
-            <a:off x="334725" y="4920443"/>
-            <a:ext cx="5035566" cy="615774"/>
-          </a:xfrm>
-          <a:prstGeom prst="rect">
-            <a:avLst/>
-          </a:prstGeom>
-          <a:solidFill>
-            <a:schemeClr val="tx1"/>
-          </a:solidFill>
-          <a:ln>
-            <a:noFill/>
-          </a:ln>
-          <a:effectLst/>
-        </p:spPr>
-        <p:style>
-          <a:lnRef idx="2">
-            <a:schemeClr val="accent1">
-              <a:shade val="50000"/>
-            </a:schemeClr>
-          </a:lnRef>
-          <a:fillRef idx="1">
-            <a:schemeClr val="accent1"/>
-          </a:fillRef>
-          <a:effectRef idx="0">
-            <a:schemeClr val="accent1"/>
-          </a:effectRef>
-          <a:fontRef idx="minor">
-            <a:schemeClr val="lt1"/>
-          </a:fontRef>
-        </p:style>
-        <p:txBody>
-          <a:bodyPr rtlCol="0" anchor="ctr"/>
-          <a:lstStyle/>
-          <a:p>
-            <a:r>
-              <a:rPr lang="es-ES" dirty="0"/>
-              <a:t> Modelos</a:t>
-            </a:r>
-          </a:p>
-        </p:txBody>
-      </p:sp>
-      <p:sp>
-        <p:nvSpPr>
-          <p:cNvPr id="58" name="Rectángulo 57">
-            <a:extLst>
-              <a:ext uri="{FF2B5EF4-FFF2-40B4-BE49-F238E27FC236}">
-                <a16:creationId xmlns:a16="http://schemas.microsoft.com/office/drawing/2014/main" id="{21E0D95E-A017-42A2-8F24-778264489AFD}"/>
-              </a:ext>
-            </a:extLst>
-          </p:cNvPr>
-          <p:cNvSpPr/>
-          <p:nvPr/>
-        </p:nvSpPr>
-        <p:spPr>
-          <a:xfrm>
-            <a:off x="6853544" y="1204631"/>
-            <a:ext cx="5022471" cy="804644"/>
-          </a:xfrm>
-          <a:prstGeom prst="rect">
-            <a:avLst/>
-          </a:prstGeom>
-          <a:solidFill>
-            <a:schemeClr val="tx1"/>
-          </a:solidFill>
-          <a:ln>
-            <a:noFill/>
-          </a:ln>
-          <a:effectLst/>
-        </p:spPr>
-        <p:style>
-          <a:lnRef idx="2">
-            <a:schemeClr val="accent1">
-              <a:shade val="50000"/>
-            </a:schemeClr>
-          </a:lnRef>
-          <a:fillRef idx="1">
-            <a:schemeClr val="accent1"/>
-          </a:fillRef>
-          <a:effectRef idx="0">
-            <a:schemeClr val="accent1"/>
-          </a:effectRef>
-          <a:fontRef idx="minor">
-            <a:schemeClr val="lt1"/>
-          </a:fontRef>
-        </p:style>
-        <p:txBody>
-          <a:bodyPr rtlCol="0" anchor="ctr"/>
-          <a:lstStyle/>
-          <a:p>
-            <a:r>
-              <a:rPr lang="es-ES" dirty="0"/>
-              <a:t>  </a:t>
-            </a:r>
-            <a:r>
-              <a:rPr lang="es-ES" dirty="0" err="1"/>
-              <a:t>Template</a:t>
-            </a:r>
-            <a:endParaRPr lang="es-ES" dirty="0"/>
-          </a:p>
-        </p:txBody>
-      </p:sp>
-      <p:sp>
-        <p:nvSpPr>
-          <p:cNvPr id="59" name="Rectángulo 58">
-            <a:extLst>
-              <a:ext uri="{FF2B5EF4-FFF2-40B4-BE49-F238E27FC236}">
-                <a16:creationId xmlns:a16="http://schemas.microsoft.com/office/drawing/2014/main" id="{0A77F683-D1C0-4806-8275-386507FCC68D}"/>
-              </a:ext>
-            </a:extLst>
-          </p:cNvPr>
-          <p:cNvSpPr/>
-          <p:nvPr/>
-        </p:nvSpPr>
-        <p:spPr>
-          <a:xfrm>
-            <a:off x="8399577" y="1338543"/>
-            <a:ext cx="3246989" cy="553660"/>
-          </a:xfrm>
-          <a:prstGeom prst="rect">
-            <a:avLst/>
-          </a:prstGeom>
-        </p:spPr>
-        <p:style>
-          <a:lnRef idx="2">
-            <a:schemeClr val="accent1">
-              <a:shade val="50000"/>
-            </a:schemeClr>
-          </a:lnRef>
-          <a:fillRef idx="1">
-            <a:schemeClr val="accent1"/>
-          </a:fillRef>
-          <a:effectRef idx="0">
-            <a:schemeClr val="accent1"/>
-          </a:effectRef>
-          <a:fontRef idx="minor">
-            <a:schemeClr val="lt1"/>
-          </a:fontRef>
-        </p:style>
-        <p:txBody>
-          <a:bodyPr rtlCol="0" anchor="ctr"/>
-          <a:lstStyle/>
-          <a:p>
-            <a:pPr algn="ctr"/>
-            <a:r>
-              <a:rPr lang="es-ES" dirty="0" err="1"/>
-              <a:t>Serializers</a:t>
-            </a:r>
-            <a:r>
-              <a:rPr lang="es-ES" dirty="0"/>
-              <a:t> (Contratos Modelo y validaciones)</a:t>
-            </a:r>
-          </a:p>
-        </p:txBody>
-      </p:sp>
-      <p:sp>
-        <p:nvSpPr>
-          <p:cNvPr id="60" name="Rectángulo 59">
-            <a:extLst>
-              <a:ext uri="{FF2B5EF4-FFF2-40B4-BE49-F238E27FC236}">
-                <a16:creationId xmlns:a16="http://schemas.microsoft.com/office/drawing/2014/main" id="{5DAC0906-AAE2-48D6-9408-516D24FFE5AE}"/>
-              </a:ext>
-            </a:extLst>
-          </p:cNvPr>
-          <p:cNvSpPr/>
-          <p:nvPr/>
-        </p:nvSpPr>
-        <p:spPr>
-          <a:xfrm>
-            <a:off x="6880310" y="2082858"/>
-            <a:ext cx="5022471" cy="1283026"/>
-          </a:xfrm>
-          <a:prstGeom prst="rect">
-            <a:avLst/>
-          </a:prstGeom>
-          <a:solidFill>
-            <a:schemeClr val="tx1"/>
-          </a:solidFill>
-          <a:ln>
-            <a:noFill/>
-          </a:ln>
-          <a:effectLst/>
-        </p:spPr>
-        <p:style>
-          <a:lnRef idx="2">
-            <a:schemeClr val="accent1">
-              <a:shade val="50000"/>
-            </a:schemeClr>
-          </a:lnRef>
-          <a:fillRef idx="1">
-            <a:schemeClr val="accent1"/>
-          </a:fillRef>
-          <a:effectRef idx="0">
-            <a:schemeClr val="accent1"/>
-          </a:effectRef>
-          <a:fontRef idx="minor">
-            <a:schemeClr val="lt1"/>
-          </a:fontRef>
-        </p:style>
-        <p:txBody>
-          <a:bodyPr rtlCol="0" anchor="ctr"/>
-          <a:lstStyle/>
-          <a:p>
-            <a:r>
-              <a:rPr lang="es-ES" dirty="0"/>
-              <a:t>  View</a:t>
-            </a:r>
-          </a:p>
-        </p:txBody>
-      </p:sp>
-      <p:sp>
-        <p:nvSpPr>
-          <p:cNvPr id="62" name="Rectángulo 61">
-            <a:extLst>
-              <a:ext uri="{FF2B5EF4-FFF2-40B4-BE49-F238E27FC236}">
-                <a16:creationId xmlns:a16="http://schemas.microsoft.com/office/drawing/2014/main" id="{76765935-24DB-44C9-A953-FAE9D7E4E69B}"/>
-              </a:ext>
-            </a:extLst>
-          </p:cNvPr>
-          <p:cNvSpPr/>
-          <p:nvPr/>
-        </p:nvSpPr>
-        <p:spPr>
-          <a:xfrm>
-            <a:off x="8399577" y="2797964"/>
-            <a:ext cx="3246989" cy="361632"/>
-          </a:xfrm>
-          <a:prstGeom prst="rect">
-            <a:avLst/>
-          </a:prstGeom>
-        </p:spPr>
-        <p:style>
-          <a:lnRef idx="2">
-            <a:schemeClr val="accent1">
-              <a:shade val="50000"/>
-            </a:schemeClr>
-          </a:lnRef>
-          <a:fillRef idx="1">
-            <a:schemeClr val="accent1"/>
-          </a:fillRef>
-          <a:effectRef idx="0">
-            <a:schemeClr val="accent1"/>
-          </a:effectRef>
-          <a:fontRef idx="minor">
-            <a:schemeClr val="lt1"/>
-          </a:fontRef>
-        </p:style>
-        <p:txBody>
-          <a:bodyPr rtlCol="0" anchor="ctr"/>
-          <a:lstStyle/>
-          <a:p>
-            <a:pPr algn="ctr"/>
-            <a:r>
-              <a:rPr lang="es-ES" dirty="0"/>
-              <a:t>Contratos (verbos)</a:t>
-            </a:r>
-          </a:p>
-        </p:txBody>
-      </p:sp>
-      <p:sp>
-        <p:nvSpPr>
-          <p:cNvPr id="63" name="Rectángulo 62">
-            <a:extLst>
-              <a:ext uri="{FF2B5EF4-FFF2-40B4-BE49-F238E27FC236}">
-                <a16:creationId xmlns:a16="http://schemas.microsoft.com/office/drawing/2014/main" id="{F2C68A42-4CF0-48D8-BE74-00365F4B8B1C}"/>
-              </a:ext>
-            </a:extLst>
-          </p:cNvPr>
-          <p:cNvSpPr/>
-          <p:nvPr/>
-        </p:nvSpPr>
-        <p:spPr>
-          <a:xfrm>
-            <a:off x="6865576" y="3452461"/>
-            <a:ext cx="5022471" cy="1200163"/>
-          </a:xfrm>
-          <a:prstGeom prst="rect">
-            <a:avLst/>
-          </a:prstGeom>
-          <a:solidFill>
-            <a:schemeClr val="tx1"/>
-          </a:solidFill>
-          <a:ln>
-            <a:noFill/>
-          </a:ln>
-          <a:effectLst/>
-        </p:spPr>
-        <p:style>
-          <a:lnRef idx="2">
-            <a:schemeClr val="accent1">
-              <a:shade val="50000"/>
-            </a:schemeClr>
-          </a:lnRef>
-          <a:fillRef idx="1">
-            <a:schemeClr val="accent1"/>
-          </a:fillRef>
-          <a:effectRef idx="0">
-            <a:schemeClr val="accent1"/>
-          </a:effectRef>
-          <a:fontRef idx="minor">
-            <a:schemeClr val="lt1"/>
-          </a:fontRef>
-        </p:style>
-        <p:txBody>
-          <a:bodyPr rtlCol="0" anchor="ctr"/>
-          <a:lstStyle/>
-          <a:p>
-            <a:r>
-              <a:rPr lang="es-ES" dirty="0"/>
-              <a:t>  </a:t>
-            </a:r>
-            <a:r>
-              <a:rPr lang="es-ES" dirty="0" err="1"/>
-              <a:t>Model</a:t>
-            </a:r>
-            <a:endParaRPr lang="es-ES" dirty="0"/>
-          </a:p>
-        </p:txBody>
-      </p:sp>
-      <p:sp>
-        <p:nvSpPr>
-          <p:cNvPr id="66" name="Rectángulo 65">
-            <a:extLst>
-              <a:ext uri="{FF2B5EF4-FFF2-40B4-BE49-F238E27FC236}">
-                <a16:creationId xmlns:a16="http://schemas.microsoft.com/office/drawing/2014/main" id="{A1D6B46D-481D-4F07-8C03-9BAA408075BD}"/>
-              </a:ext>
-            </a:extLst>
-          </p:cNvPr>
-          <p:cNvSpPr/>
-          <p:nvPr/>
-        </p:nvSpPr>
-        <p:spPr>
-          <a:xfrm>
-            <a:off x="8410969" y="4749732"/>
-            <a:ext cx="3246989" cy="361632"/>
-          </a:xfrm>
-          <a:prstGeom prst="rect">
-            <a:avLst/>
-          </a:prstGeom>
           <a:effectLst>
-            <a:glow rad="139700">
-              <a:schemeClr val="accent3">
-                <a:satMod val="175000"/>
-                <a:alpha val="40000"/>
-              </a:schemeClr>
-            </a:glow>
+            <a:softEdge rad="25400"/>
           </a:effectLst>
         </p:spPr>
         <p:style>
@@ -9138,20 +8757,19 @@
           <a:bodyPr rtlCol="0" anchor="ctr"/>
           <a:lstStyle/>
           <a:p>
-            <a:pPr algn="ctr"/>
             <a:r>
               <a:rPr lang="es-ES" dirty="0"/>
-              <a:t>Gestión de errores</a:t>
-            </a:r>
-          </a:p>
-        </p:txBody>
-      </p:sp>
-      <p:sp>
-        <p:nvSpPr>
-          <p:cNvPr id="67" name="Rectángulo 66">
-            <a:extLst>
-              <a:ext uri="{FF2B5EF4-FFF2-40B4-BE49-F238E27FC236}">
-                <a16:creationId xmlns:a16="http://schemas.microsoft.com/office/drawing/2014/main" id="{8417912C-688C-44C2-8348-6E4C021B67C0}"/>
+              <a:t> Servicios</a:t>
+            </a:r>
+          </a:p>
+        </p:txBody>
+      </p:sp>
+      <p:sp>
+        <p:nvSpPr>
+          <p:cNvPr id="53" name="Rectángulo 52">
+            <a:extLst>
+              <a:ext uri="{FF2B5EF4-FFF2-40B4-BE49-F238E27FC236}">
+                <a16:creationId xmlns:a16="http://schemas.microsoft.com/office/drawing/2014/main" id="{E28442C2-5193-4CC3-89B9-BEFE5C79D7E3}"/>
               </a:ext>
             </a:extLst>
           </p:cNvPr>
@@ -9160,19 +8778,20 @@
         </p:nvSpPr>
         <p:spPr>
           <a:xfrm>
-            <a:off x="8410969" y="5205292"/>
-            <a:ext cx="3246989" cy="361632"/>
+            <a:off x="335909" y="5580286"/>
+            <a:ext cx="5034382" cy="1064378"/>
           </a:xfrm>
           <a:prstGeom prst="rect">
             <a:avLst/>
           </a:prstGeom>
+          <a:solidFill>
+            <a:schemeClr val="tx1"/>
+          </a:solidFill>
+          <a:ln>
+            <a:noFill/>
+          </a:ln>
           <a:effectLst>
-            <a:glow rad="139700">
-              <a:schemeClr val="accent3">
-                <a:satMod val="175000"/>
-                <a:alpha val="40000"/>
-              </a:schemeClr>
-            </a:glow>
+            <a:softEdge rad="25400"/>
           </a:effectLst>
         </p:spPr>
         <p:style>
@@ -9195,6 +8814,468 @@
           <a:bodyPr rtlCol="0" anchor="ctr"/>
           <a:lstStyle/>
           <a:p>
+            <a:r>
+              <a:rPr lang="en-US"/>
+              <a:t>Implementación</a:t>
+            </a:r>
+            <a:endParaRPr lang="es-ES" dirty="0"/>
+          </a:p>
+        </p:txBody>
+      </p:sp>
+      <p:sp>
+        <p:nvSpPr>
+          <p:cNvPr id="55" name="Rectángulo 54">
+            <a:extLst>
+              <a:ext uri="{FF2B5EF4-FFF2-40B4-BE49-F238E27FC236}">
+                <a16:creationId xmlns:a16="http://schemas.microsoft.com/office/drawing/2014/main" id="{44856DE2-4E8F-4918-BC1B-D32FD7034FFE}"/>
+              </a:ext>
+            </a:extLst>
+          </p:cNvPr>
+          <p:cNvSpPr/>
+          <p:nvPr/>
+        </p:nvSpPr>
+        <p:spPr>
+          <a:xfrm>
+            <a:off x="334725" y="4920443"/>
+            <a:ext cx="5035566" cy="615774"/>
+          </a:xfrm>
+          <a:prstGeom prst="rect">
+            <a:avLst/>
+          </a:prstGeom>
+          <a:solidFill>
+            <a:schemeClr val="tx1"/>
+          </a:solidFill>
+          <a:ln>
+            <a:noFill/>
+          </a:ln>
+          <a:effectLst>
+            <a:softEdge rad="25400"/>
+          </a:effectLst>
+        </p:spPr>
+        <p:style>
+          <a:lnRef idx="2">
+            <a:schemeClr val="accent1">
+              <a:shade val="50000"/>
+            </a:schemeClr>
+          </a:lnRef>
+          <a:fillRef idx="1">
+            <a:schemeClr val="accent1"/>
+          </a:fillRef>
+          <a:effectRef idx="0">
+            <a:schemeClr val="accent1"/>
+          </a:effectRef>
+          <a:fontRef idx="minor">
+            <a:schemeClr val="lt1"/>
+          </a:fontRef>
+        </p:style>
+        <p:txBody>
+          <a:bodyPr rtlCol="0" anchor="ctr"/>
+          <a:lstStyle/>
+          <a:p>
+            <a:r>
+              <a:rPr lang="es-ES" dirty="0"/>
+              <a:t> Modelos</a:t>
+            </a:r>
+          </a:p>
+        </p:txBody>
+      </p:sp>
+      <p:sp>
+        <p:nvSpPr>
+          <p:cNvPr id="58" name="Rectángulo 57">
+            <a:extLst>
+              <a:ext uri="{FF2B5EF4-FFF2-40B4-BE49-F238E27FC236}">
+                <a16:creationId xmlns:a16="http://schemas.microsoft.com/office/drawing/2014/main" id="{21E0D95E-A017-42A2-8F24-778264489AFD}"/>
+              </a:ext>
+            </a:extLst>
+          </p:cNvPr>
+          <p:cNvSpPr/>
+          <p:nvPr/>
+        </p:nvSpPr>
+        <p:spPr>
+          <a:xfrm>
+            <a:off x="6853544" y="1204631"/>
+            <a:ext cx="5022471" cy="804644"/>
+          </a:xfrm>
+          <a:prstGeom prst="rect">
+            <a:avLst/>
+          </a:prstGeom>
+          <a:solidFill>
+            <a:schemeClr val="tx1"/>
+          </a:solidFill>
+          <a:ln>
+            <a:noFill/>
+          </a:ln>
+          <a:effectLst>
+            <a:softEdge rad="25400"/>
+          </a:effectLst>
+        </p:spPr>
+        <p:style>
+          <a:lnRef idx="2">
+            <a:schemeClr val="accent1">
+              <a:shade val="50000"/>
+            </a:schemeClr>
+          </a:lnRef>
+          <a:fillRef idx="1">
+            <a:schemeClr val="accent1"/>
+          </a:fillRef>
+          <a:effectRef idx="0">
+            <a:schemeClr val="accent1"/>
+          </a:effectRef>
+          <a:fontRef idx="minor">
+            <a:schemeClr val="lt1"/>
+          </a:fontRef>
+        </p:style>
+        <p:txBody>
+          <a:bodyPr rtlCol="0" anchor="ctr"/>
+          <a:lstStyle/>
+          <a:p>
+            <a:r>
+              <a:rPr lang="es-ES" dirty="0"/>
+              <a:t>  </a:t>
+            </a:r>
+            <a:r>
+              <a:rPr lang="es-ES" dirty="0" err="1"/>
+              <a:t>Template</a:t>
+            </a:r>
+            <a:endParaRPr lang="es-ES" dirty="0"/>
+          </a:p>
+        </p:txBody>
+      </p:sp>
+      <p:sp>
+        <p:nvSpPr>
+          <p:cNvPr id="59" name="Rectángulo 58">
+            <a:extLst>
+              <a:ext uri="{FF2B5EF4-FFF2-40B4-BE49-F238E27FC236}">
+                <a16:creationId xmlns:a16="http://schemas.microsoft.com/office/drawing/2014/main" id="{0A77F683-D1C0-4806-8275-386507FCC68D}"/>
+              </a:ext>
+            </a:extLst>
+          </p:cNvPr>
+          <p:cNvSpPr/>
+          <p:nvPr/>
+        </p:nvSpPr>
+        <p:spPr>
+          <a:xfrm>
+            <a:off x="8399577" y="1338543"/>
+            <a:ext cx="3246989" cy="553660"/>
+          </a:xfrm>
+          <a:prstGeom prst="rect">
+            <a:avLst/>
+          </a:prstGeom>
+          <a:effectLst>
+            <a:softEdge rad="25400"/>
+          </a:effectLst>
+        </p:spPr>
+        <p:style>
+          <a:lnRef idx="2">
+            <a:schemeClr val="accent1">
+              <a:shade val="50000"/>
+            </a:schemeClr>
+          </a:lnRef>
+          <a:fillRef idx="1">
+            <a:schemeClr val="accent1"/>
+          </a:fillRef>
+          <a:effectRef idx="0">
+            <a:schemeClr val="accent1"/>
+          </a:effectRef>
+          <a:fontRef idx="minor">
+            <a:schemeClr val="lt1"/>
+          </a:fontRef>
+        </p:style>
+        <p:txBody>
+          <a:bodyPr rtlCol="0" anchor="ctr"/>
+          <a:lstStyle/>
+          <a:p>
+            <a:pPr algn="ctr"/>
+            <a:r>
+              <a:rPr lang="es-ES" dirty="0" err="1"/>
+              <a:t>Serializers</a:t>
+            </a:r>
+            <a:r>
+              <a:rPr lang="es-ES" dirty="0"/>
+              <a:t> (Contratos Modelo y validaciones)</a:t>
+            </a:r>
+          </a:p>
+        </p:txBody>
+      </p:sp>
+      <p:sp>
+        <p:nvSpPr>
+          <p:cNvPr id="60" name="Rectángulo 59">
+            <a:extLst>
+              <a:ext uri="{FF2B5EF4-FFF2-40B4-BE49-F238E27FC236}">
+                <a16:creationId xmlns:a16="http://schemas.microsoft.com/office/drawing/2014/main" id="{5DAC0906-AAE2-48D6-9408-516D24FFE5AE}"/>
+              </a:ext>
+            </a:extLst>
+          </p:cNvPr>
+          <p:cNvSpPr/>
+          <p:nvPr/>
+        </p:nvSpPr>
+        <p:spPr>
+          <a:xfrm>
+            <a:off x="6880310" y="2082858"/>
+            <a:ext cx="5022471" cy="1283026"/>
+          </a:xfrm>
+          <a:prstGeom prst="rect">
+            <a:avLst/>
+          </a:prstGeom>
+          <a:solidFill>
+            <a:schemeClr val="tx1"/>
+          </a:solidFill>
+          <a:ln>
+            <a:noFill/>
+          </a:ln>
+          <a:effectLst>
+            <a:softEdge rad="25400"/>
+          </a:effectLst>
+        </p:spPr>
+        <p:style>
+          <a:lnRef idx="2">
+            <a:schemeClr val="accent1">
+              <a:shade val="50000"/>
+            </a:schemeClr>
+          </a:lnRef>
+          <a:fillRef idx="1">
+            <a:schemeClr val="accent1"/>
+          </a:fillRef>
+          <a:effectRef idx="0">
+            <a:schemeClr val="accent1"/>
+          </a:effectRef>
+          <a:fontRef idx="minor">
+            <a:schemeClr val="lt1"/>
+          </a:fontRef>
+        </p:style>
+        <p:txBody>
+          <a:bodyPr rtlCol="0" anchor="ctr"/>
+          <a:lstStyle/>
+          <a:p>
+            <a:r>
+              <a:rPr lang="es-ES" dirty="0"/>
+              <a:t>  View</a:t>
+            </a:r>
+          </a:p>
+        </p:txBody>
+      </p:sp>
+      <p:sp>
+        <p:nvSpPr>
+          <p:cNvPr id="62" name="Rectángulo 61">
+            <a:extLst>
+              <a:ext uri="{FF2B5EF4-FFF2-40B4-BE49-F238E27FC236}">
+                <a16:creationId xmlns:a16="http://schemas.microsoft.com/office/drawing/2014/main" id="{76765935-24DB-44C9-A953-FAE9D7E4E69B}"/>
+              </a:ext>
+            </a:extLst>
+          </p:cNvPr>
+          <p:cNvSpPr/>
+          <p:nvPr/>
+        </p:nvSpPr>
+        <p:spPr>
+          <a:xfrm>
+            <a:off x="8399577" y="2797964"/>
+            <a:ext cx="3246989" cy="361632"/>
+          </a:xfrm>
+          <a:prstGeom prst="rect">
+            <a:avLst/>
+          </a:prstGeom>
+          <a:effectLst>
+            <a:softEdge rad="25400"/>
+          </a:effectLst>
+        </p:spPr>
+        <p:style>
+          <a:lnRef idx="2">
+            <a:schemeClr val="accent1">
+              <a:shade val="50000"/>
+            </a:schemeClr>
+          </a:lnRef>
+          <a:fillRef idx="1">
+            <a:schemeClr val="accent1"/>
+          </a:fillRef>
+          <a:effectRef idx="0">
+            <a:schemeClr val="accent1"/>
+          </a:effectRef>
+          <a:fontRef idx="minor">
+            <a:schemeClr val="lt1"/>
+          </a:fontRef>
+        </p:style>
+        <p:txBody>
+          <a:bodyPr rtlCol="0" anchor="ctr"/>
+          <a:lstStyle/>
+          <a:p>
+            <a:pPr algn="ctr"/>
+            <a:r>
+              <a:rPr lang="es-ES" dirty="0"/>
+              <a:t>Contratos (verbos)</a:t>
+            </a:r>
+          </a:p>
+        </p:txBody>
+      </p:sp>
+      <p:sp>
+        <p:nvSpPr>
+          <p:cNvPr id="63" name="Rectángulo 62">
+            <a:extLst>
+              <a:ext uri="{FF2B5EF4-FFF2-40B4-BE49-F238E27FC236}">
+                <a16:creationId xmlns:a16="http://schemas.microsoft.com/office/drawing/2014/main" id="{F2C68A42-4CF0-48D8-BE74-00365F4B8B1C}"/>
+              </a:ext>
+            </a:extLst>
+          </p:cNvPr>
+          <p:cNvSpPr/>
+          <p:nvPr/>
+        </p:nvSpPr>
+        <p:spPr>
+          <a:xfrm>
+            <a:off x="6865576" y="3452461"/>
+            <a:ext cx="5022471" cy="1200163"/>
+          </a:xfrm>
+          <a:prstGeom prst="rect">
+            <a:avLst/>
+          </a:prstGeom>
+          <a:solidFill>
+            <a:schemeClr val="tx1"/>
+          </a:solidFill>
+          <a:ln>
+            <a:noFill/>
+          </a:ln>
+          <a:effectLst>
+            <a:softEdge rad="25400"/>
+          </a:effectLst>
+        </p:spPr>
+        <p:style>
+          <a:lnRef idx="2">
+            <a:schemeClr val="accent1">
+              <a:shade val="50000"/>
+            </a:schemeClr>
+          </a:lnRef>
+          <a:fillRef idx="1">
+            <a:schemeClr val="accent1"/>
+          </a:fillRef>
+          <a:effectRef idx="0">
+            <a:schemeClr val="accent1"/>
+          </a:effectRef>
+          <a:fontRef idx="minor">
+            <a:schemeClr val="lt1"/>
+          </a:fontRef>
+        </p:style>
+        <p:txBody>
+          <a:bodyPr rtlCol="0" anchor="ctr"/>
+          <a:lstStyle/>
+          <a:p>
+            <a:r>
+              <a:rPr lang="es-ES" dirty="0"/>
+              <a:t>  </a:t>
+            </a:r>
+            <a:r>
+              <a:rPr lang="es-ES" dirty="0" err="1"/>
+              <a:t>Model</a:t>
+            </a:r>
+            <a:endParaRPr lang="es-ES" dirty="0"/>
+          </a:p>
+        </p:txBody>
+      </p:sp>
+      <p:sp>
+        <p:nvSpPr>
+          <p:cNvPr id="66" name="Rectángulo 65">
+            <a:extLst>
+              <a:ext uri="{FF2B5EF4-FFF2-40B4-BE49-F238E27FC236}">
+                <a16:creationId xmlns:a16="http://schemas.microsoft.com/office/drawing/2014/main" id="{A1D6B46D-481D-4F07-8C03-9BAA408075BD}"/>
+              </a:ext>
+            </a:extLst>
+          </p:cNvPr>
+          <p:cNvSpPr/>
+          <p:nvPr/>
+        </p:nvSpPr>
+        <p:spPr>
+          <a:xfrm>
+            <a:off x="8410969" y="4749732"/>
+            <a:ext cx="3246989" cy="361632"/>
+          </a:xfrm>
+          <a:prstGeom prst="rect">
+            <a:avLst/>
+          </a:prstGeom>
+          <a:effectLst>
+            <a:glow rad="139700">
+              <a:schemeClr val="accent3">
+                <a:satMod val="175000"/>
+                <a:alpha val="40000"/>
+              </a:schemeClr>
+            </a:glow>
+            <a:softEdge rad="25400"/>
+          </a:effectLst>
+        </p:spPr>
+        <p:style>
+          <a:lnRef idx="2">
+            <a:schemeClr val="accent1">
+              <a:shade val="50000"/>
+            </a:schemeClr>
+          </a:lnRef>
+          <a:fillRef idx="1">
+            <a:schemeClr val="accent1"/>
+          </a:fillRef>
+          <a:effectRef idx="0">
+            <a:schemeClr val="accent1"/>
+          </a:effectRef>
+          <a:fontRef idx="minor">
+            <a:schemeClr val="lt1"/>
+          </a:fontRef>
+        </p:style>
+        <p:txBody>
+          <a:bodyPr rtlCol="0" anchor="ctr"/>
+          <a:lstStyle/>
+          <a:p>
+            <a:pPr algn="ctr"/>
+            <a:r>
+              <a:rPr lang="es-ES" dirty="0"/>
+              <a:t>Gestión de errores</a:t>
+            </a:r>
+          </a:p>
+        </p:txBody>
+      </p:sp>
+      <p:sp>
+        <p:nvSpPr>
+          <p:cNvPr id="67" name="Rectángulo 66">
+            <a:extLst>
+              <a:ext uri="{FF2B5EF4-FFF2-40B4-BE49-F238E27FC236}">
+                <a16:creationId xmlns:a16="http://schemas.microsoft.com/office/drawing/2014/main" id="{8417912C-688C-44C2-8348-6E4C021B67C0}"/>
+              </a:ext>
+            </a:extLst>
+          </p:cNvPr>
+          <p:cNvSpPr/>
+          <p:nvPr/>
+        </p:nvSpPr>
+        <p:spPr>
+          <a:xfrm>
+            <a:off x="8410969" y="5205292"/>
+            <a:ext cx="3246989" cy="361632"/>
+          </a:xfrm>
+          <a:prstGeom prst="rect">
+            <a:avLst/>
+          </a:prstGeom>
+          <a:effectLst>
+            <a:glow rad="139700">
+              <a:schemeClr val="accent3">
+                <a:satMod val="175000"/>
+                <a:alpha val="40000"/>
+              </a:schemeClr>
+            </a:glow>
+            <a:softEdge rad="25400"/>
+          </a:effectLst>
+        </p:spPr>
+        <p:style>
+          <a:lnRef idx="2">
+            <a:schemeClr val="accent1">
+              <a:shade val="50000"/>
+            </a:schemeClr>
+          </a:lnRef>
+          <a:fillRef idx="1">
+            <a:schemeClr val="accent1"/>
+          </a:fillRef>
+          <a:effectRef idx="0">
+            <a:schemeClr val="accent1"/>
+          </a:effectRef>
+          <a:fontRef idx="minor">
+            <a:schemeClr val="lt1"/>
+          </a:fontRef>
+        </p:style>
+        <p:txBody>
+          <a:bodyPr rtlCol="0" anchor="ctr"/>
+          <a:lstStyle/>
+          <a:p>
             <a:pPr algn="ctr"/>
             <a:r>
               <a:rPr lang="es-ES" dirty="0"/>
@@ -9223,6 +9304,9 @@
           <a:prstGeom prst="rect">
             <a:avLst/>
           </a:prstGeom>
+          <a:effectLst>
+            <a:softEdge rad="25400"/>
+          </a:effectLst>
         </p:spPr>
         <p:style>
           <a:lnRef idx="2">
@@ -9445,12 +9529,14 @@
             <a:avLst/>
           </a:prstGeom>
           <a:solidFill>
-            <a:srgbClr val="C40000"/>
+            <a:srgbClr val="8E0000"/>
           </a:solidFill>
           <a:ln>
             <a:noFill/>
           </a:ln>
-          <a:effectLst/>
+          <a:effectLst>
+            <a:softEdge rad="25400"/>
+          </a:effectLst>
         </p:spPr>
         <p:style>
           <a:lnRef idx="1">
@@ -9507,12 +9593,14 @@
             <a:avLst/>
           </a:prstGeom>
           <a:solidFill>
-            <a:srgbClr val="C40000"/>
+            <a:srgbClr val="8E0000"/>
           </a:solidFill>
           <a:ln>
             <a:noFill/>
           </a:ln>
-          <a:effectLst/>
+          <a:effectLst>
+            <a:softEdge rad="25400"/>
+          </a:effectLst>
         </p:spPr>
         <p:style>
           <a:lnRef idx="1">
@@ -9566,6 +9654,9 @@
           <a:solidFill>
             <a:srgbClr val="294983"/>
           </a:solidFill>
+          <a:effectLst>
+            <a:softEdge rad="25400"/>
+          </a:effectLst>
         </p:spPr>
         <p:style>
           <a:lnRef idx="2">
@@ -9655,7 +9746,9 @@
           <a:ln>
             <a:noFill/>
           </a:ln>
-          <a:effectLst/>
+          <a:effectLst>
+            <a:softEdge rad="25400"/>
+          </a:effectLst>
         </p:spPr>
         <p:style>
           <a:lnRef idx="2">
@@ -9710,7 +9803,9 @@
           <a:ln>
             <a:noFill/>
           </a:ln>
-          <a:effectLst/>
+          <a:effectLst>
+            <a:softEdge rad="25400"/>
+          </a:effectLst>
         </p:spPr>
         <p:style>
           <a:lnRef idx="1">
@@ -9768,7 +9863,9 @@
           <a:ln>
             <a:noFill/>
           </a:ln>
-          <a:effectLst/>
+          <a:effectLst>
+            <a:softEdge rad="25400"/>
+          </a:effectLst>
         </p:spPr>
         <p:style>
           <a:lnRef idx="1">
@@ -9831,7 +9928,9 @@
           <a:ln>
             <a:noFill/>
           </a:ln>
-          <a:effectLst/>
+          <a:effectLst>
+            <a:softEdge rad="25400"/>
+          </a:effectLst>
         </p:spPr>
         <p:style>
           <a:lnRef idx="1">
@@ -9889,7 +9988,9 @@
           <a:ln>
             <a:noFill/>
           </a:ln>
-          <a:effectLst/>
+          <a:effectLst>
+            <a:softEdge rad="25400"/>
+          </a:effectLst>
         </p:spPr>
         <p:style>
           <a:lnRef idx="1">
@@ -9942,12 +10043,14 @@
             <a:avLst/>
           </a:prstGeom>
           <a:solidFill>
-            <a:srgbClr val="C40000"/>
+            <a:srgbClr val="8E0000"/>
           </a:solidFill>
           <a:ln>
             <a:noFill/>
           </a:ln>
-          <a:effectLst/>
+          <a:effectLst>
+            <a:softEdge rad="25400"/>
+          </a:effectLst>
         </p:spPr>
         <p:style>
           <a:lnRef idx="1">
@@ -10009,7 +10112,9 @@
           <a:ln>
             <a:noFill/>
           </a:ln>
-          <a:effectLst/>
+          <a:effectLst>
+            <a:softEdge rad="25400"/>
+          </a:effectLst>
         </p:spPr>
         <p:style>
           <a:lnRef idx="2">
@@ -10071,6 +10176,7 @@
                 <a:alpha val="40000"/>
               </a:schemeClr>
             </a:glow>
+            <a:softEdge rad="25400"/>
           </a:effectLst>
         </p:spPr>
         <p:style>
@@ -10129,286 +10235,8 @@
           <a:ln>
             <a:noFill/>
           </a:ln>
-          <a:effectLst/>
-        </p:spPr>
-        <p:style>
-          <a:lnRef idx="2">
-            <a:schemeClr val="accent1">
-              <a:shade val="50000"/>
-            </a:schemeClr>
-          </a:lnRef>
-          <a:fillRef idx="1">
-            <a:schemeClr val="accent1"/>
-          </a:fillRef>
-          <a:effectRef idx="0">
-            <a:schemeClr val="accent1"/>
-          </a:effectRef>
-          <a:fontRef idx="minor">
-            <a:schemeClr val="lt1"/>
-          </a:fontRef>
-        </p:style>
-        <p:txBody>
-          <a:bodyPr rtlCol="0" anchor="ctr"/>
-          <a:lstStyle/>
-          <a:p>
-            <a:r>
-              <a:rPr lang="en-US" dirty="0" err="1"/>
-              <a:t>Implementación</a:t>
-            </a:r>
-            <a:endParaRPr lang="es-ES" dirty="0"/>
-          </a:p>
-        </p:txBody>
-      </p:sp>
-      <p:sp>
-        <p:nvSpPr>
-          <p:cNvPr id="55" name="Rectángulo 54">
-            <a:extLst>
-              <a:ext uri="{FF2B5EF4-FFF2-40B4-BE49-F238E27FC236}">
-                <a16:creationId xmlns:a16="http://schemas.microsoft.com/office/drawing/2014/main" id="{15C2F0DD-33CE-46C5-9C85-436EFDE23533}"/>
-              </a:ext>
-            </a:extLst>
-          </p:cNvPr>
-          <p:cNvSpPr/>
-          <p:nvPr/>
-        </p:nvSpPr>
-        <p:spPr>
-          <a:xfrm>
-            <a:off x="334725" y="4920443"/>
-            <a:ext cx="5035566" cy="615774"/>
-          </a:xfrm>
-          <a:prstGeom prst="rect">
-            <a:avLst/>
-          </a:prstGeom>
-          <a:solidFill>
-            <a:schemeClr val="tx1"/>
-          </a:solidFill>
-          <a:ln>
-            <a:noFill/>
-          </a:ln>
-          <a:effectLst/>
-        </p:spPr>
-        <p:style>
-          <a:lnRef idx="2">
-            <a:schemeClr val="accent1">
-              <a:shade val="50000"/>
-            </a:schemeClr>
-          </a:lnRef>
-          <a:fillRef idx="1">
-            <a:schemeClr val="accent1"/>
-          </a:fillRef>
-          <a:effectRef idx="0">
-            <a:schemeClr val="accent1"/>
-          </a:effectRef>
-          <a:fontRef idx="minor">
-            <a:schemeClr val="lt1"/>
-          </a:fontRef>
-        </p:style>
-        <p:txBody>
-          <a:bodyPr rtlCol="0" anchor="ctr"/>
-          <a:lstStyle/>
-          <a:p>
-            <a:r>
-              <a:rPr lang="es-ES" dirty="0"/>
-              <a:t> Modelos</a:t>
-            </a:r>
-          </a:p>
-        </p:txBody>
-      </p:sp>
-      <p:sp>
-        <p:nvSpPr>
-          <p:cNvPr id="58" name="Rectángulo 57">
-            <a:extLst>
-              <a:ext uri="{FF2B5EF4-FFF2-40B4-BE49-F238E27FC236}">
-                <a16:creationId xmlns:a16="http://schemas.microsoft.com/office/drawing/2014/main" id="{5D3AB62B-1D77-43D5-B7BF-A0443E874595}"/>
-              </a:ext>
-            </a:extLst>
-          </p:cNvPr>
-          <p:cNvSpPr/>
-          <p:nvPr/>
-        </p:nvSpPr>
-        <p:spPr>
-          <a:xfrm>
-            <a:off x="6853544" y="1204631"/>
-            <a:ext cx="5022471" cy="804644"/>
-          </a:xfrm>
-          <a:prstGeom prst="rect">
-            <a:avLst/>
-          </a:prstGeom>
-          <a:solidFill>
-            <a:schemeClr val="tx1"/>
-          </a:solidFill>
-          <a:ln>
-            <a:noFill/>
-          </a:ln>
-          <a:effectLst/>
-        </p:spPr>
-        <p:style>
-          <a:lnRef idx="2">
-            <a:schemeClr val="accent1">
-              <a:shade val="50000"/>
-            </a:schemeClr>
-          </a:lnRef>
-          <a:fillRef idx="1">
-            <a:schemeClr val="accent1"/>
-          </a:fillRef>
-          <a:effectRef idx="0">
-            <a:schemeClr val="accent1"/>
-          </a:effectRef>
-          <a:fontRef idx="minor">
-            <a:schemeClr val="lt1"/>
-          </a:fontRef>
-        </p:style>
-        <p:txBody>
-          <a:bodyPr rtlCol="0" anchor="ctr"/>
-          <a:lstStyle/>
-          <a:p>
-            <a:r>
-              <a:rPr lang="es-ES" dirty="0"/>
-              <a:t>  </a:t>
-            </a:r>
-            <a:r>
-              <a:rPr lang="es-ES" dirty="0" err="1"/>
-              <a:t>Template</a:t>
-            </a:r>
-            <a:endParaRPr lang="es-ES" dirty="0"/>
-          </a:p>
-        </p:txBody>
-      </p:sp>
-      <p:sp>
-        <p:nvSpPr>
-          <p:cNvPr id="59" name="Rectángulo 58">
-            <a:extLst>
-              <a:ext uri="{FF2B5EF4-FFF2-40B4-BE49-F238E27FC236}">
-                <a16:creationId xmlns:a16="http://schemas.microsoft.com/office/drawing/2014/main" id="{30D42AEB-BF36-422F-91A4-A65027841CF2}"/>
-              </a:ext>
-            </a:extLst>
-          </p:cNvPr>
-          <p:cNvSpPr/>
-          <p:nvPr/>
-        </p:nvSpPr>
-        <p:spPr>
-          <a:xfrm>
-            <a:off x="8399577" y="1338543"/>
-            <a:ext cx="3246989" cy="553660"/>
-          </a:xfrm>
-          <a:prstGeom prst="rect">
-            <a:avLst/>
-          </a:prstGeom>
-        </p:spPr>
-        <p:style>
-          <a:lnRef idx="2">
-            <a:schemeClr val="accent1">
-              <a:shade val="50000"/>
-            </a:schemeClr>
-          </a:lnRef>
-          <a:fillRef idx="1">
-            <a:schemeClr val="accent1"/>
-          </a:fillRef>
-          <a:effectRef idx="0">
-            <a:schemeClr val="accent1"/>
-          </a:effectRef>
-          <a:fontRef idx="minor">
-            <a:schemeClr val="lt1"/>
-          </a:fontRef>
-        </p:style>
-        <p:txBody>
-          <a:bodyPr rtlCol="0" anchor="ctr"/>
-          <a:lstStyle/>
-          <a:p>
-            <a:pPr algn="ctr"/>
-            <a:r>
-              <a:rPr lang="es-ES" dirty="0" err="1"/>
-              <a:t>Serializers</a:t>
-            </a:r>
-            <a:r>
-              <a:rPr lang="es-ES" dirty="0"/>
-              <a:t> (Contratos Modelo y validaciones)</a:t>
-            </a:r>
-          </a:p>
-        </p:txBody>
-      </p:sp>
-      <p:sp>
-        <p:nvSpPr>
-          <p:cNvPr id="60" name="Rectángulo 59">
-            <a:extLst>
-              <a:ext uri="{FF2B5EF4-FFF2-40B4-BE49-F238E27FC236}">
-                <a16:creationId xmlns:a16="http://schemas.microsoft.com/office/drawing/2014/main" id="{76D252E6-29C3-4359-AA63-38F050374E17}"/>
-              </a:ext>
-            </a:extLst>
-          </p:cNvPr>
-          <p:cNvSpPr/>
-          <p:nvPr/>
-        </p:nvSpPr>
-        <p:spPr>
-          <a:xfrm>
-            <a:off x="6880310" y="2082858"/>
-            <a:ext cx="5022471" cy="1283026"/>
-          </a:xfrm>
-          <a:prstGeom prst="rect">
-            <a:avLst/>
-          </a:prstGeom>
-          <a:solidFill>
-            <a:schemeClr val="tx1"/>
-          </a:solidFill>
-          <a:ln>
-            <a:noFill/>
-          </a:ln>
-          <a:effectLst/>
-        </p:spPr>
-        <p:style>
-          <a:lnRef idx="2">
-            <a:schemeClr val="accent1">
-              <a:shade val="50000"/>
-            </a:schemeClr>
-          </a:lnRef>
-          <a:fillRef idx="1">
-            <a:schemeClr val="accent1"/>
-          </a:fillRef>
-          <a:effectRef idx="0">
-            <a:schemeClr val="accent1"/>
-          </a:effectRef>
-          <a:fontRef idx="minor">
-            <a:schemeClr val="lt1"/>
-          </a:fontRef>
-        </p:style>
-        <p:txBody>
-          <a:bodyPr rtlCol="0" anchor="ctr"/>
-          <a:lstStyle/>
-          <a:p>
-            <a:r>
-              <a:rPr lang="es-ES" dirty="0"/>
-              <a:t>  View</a:t>
-            </a:r>
-          </a:p>
-        </p:txBody>
-      </p:sp>
-      <p:sp>
-        <p:nvSpPr>
-          <p:cNvPr id="61" name="Rectángulo 60">
-            <a:extLst>
-              <a:ext uri="{FF2B5EF4-FFF2-40B4-BE49-F238E27FC236}">
-                <a16:creationId xmlns:a16="http://schemas.microsoft.com/office/drawing/2014/main" id="{198F6D9A-057C-4A53-A024-BC69DA908F25}"/>
-              </a:ext>
-            </a:extLst>
-          </p:cNvPr>
-          <p:cNvSpPr/>
-          <p:nvPr/>
-        </p:nvSpPr>
-        <p:spPr>
-          <a:xfrm>
-            <a:off x="8399578" y="2271503"/>
-            <a:ext cx="3246989" cy="361632"/>
-          </a:xfrm>
-          <a:prstGeom prst="rect">
-            <a:avLst/>
-          </a:prstGeom>
           <a:effectLst>
-            <a:glow rad="139700">
-              <a:schemeClr val="accent3">
-                <a:satMod val="175000"/>
-                <a:alpha val="40000"/>
-              </a:schemeClr>
-            </a:glow>
+            <a:softEdge rad="25400"/>
           </a:effectLst>
         </p:spPr>
         <p:style>
@@ -10431,20 +10259,20 @@
           <a:bodyPr rtlCol="0" anchor="ctr"/>
           <a:lstStyle/>
           <a:p>
-            <a:pPr algn="ctr"/>
-            <a:r>
-              <a:rPr lang="es-ES" dirty="0"/>
-              <a:t>Lógica de negocio</a:t>
-            </a:r>
-          </a:p>
-        </p:txBody>
-      </p:sp>
-      <p:sp>
-        <p:nvSpPr>
-          <p:cNvPr id="62" name="Rectángulo 61">
-            <a:extLst>
-              <a:ext uri="{FF2B5EF4-FFF2-40B4-BE49-F238E27FC236}">
-                <a16:creationId xmlns:a16="http://schemas.microsoft.com/office/drawing/2014/main" id="{B0842A79-0103-4343-8E50-A166BC851206}"/>
+            <a:r>
+              <a:rPr lang="en-US"/>
+              <a:t>Implementación</a:t>
+            </a:r>
+            <a:endParaRPr lang="es-ES" dirty="0"/>
+          </a:p>
+        </p:txBody>
+      </p:sp>
+      <p:sp>
+        <p:nvSpPr>
+          <p:cNvPr id="55" name="Rectángulo 54">
+            <a:extLst>
+              <a:ext uri="{FF2B5EF4-FFF2-40B4-BE49-F238E27FC236}">
+                <a16:creationId xmlns:a16="http://schemas.microsoft.com/office/drawing/2014/main" id="{15C2F0DD-33CE-46C5-9C85-436EFDE23533}"/>
               </a:ext>
             </a:extLst>
           </p:cNvPr>
@@ -10453,12 +10281,21 @@
         </p:nvSpPr>
         <p:spPr>
           <a:xfrm>
-            <a:off x="8399577" y="2797964"/>
-            <a:ext cx="3246989" cy="361632"/>
+            <a:off x="334725" y="4920443"/>
+            <a:ext cx="5035566" cy="615774"/>
           </a:xfrm>
           <a:prstGeom prst="rect">
             <a:avLst/>
           </a:prstGeom>
+          <a:solidFill>
+            <a:schemeClr val="tx1"/>
+          </a:solidFill>
+          <a:ln>
+            <a:noFill/>
+          </a:ln>
+          <a:effectLst>
+            <a:softEdge rad="25400"/>
+          </a:effectLst>
         </p:spPr>
         <p:style>
           <a:lnRef idx="2">
@@ -10480,20 +10317,19 @@
           <a:bodyPr rtlCol="0" anchor="ctr"/>
           <a:lstStyle/>
           <a:p>
-            <a:pPr algn="ctr"/>
             <a:r>
               <a:rPr lang="es-ES" dirty="0"/>
-              <a:t>Contratos (verbos)</a:t>
-            </a:r>
-          </a:p>
-        </p:txBody>
-      </p:sp>
-      <p:sp>
-        <p:nvSpPr>
-          <p:cNvPr id="63" name="Rectángulo 62">
-            <a:extLst>
-              <a:ext uri="{FF2B5EF4-FFF2-40B4-BE49-F238E27FC236}">
-                <a16:creationId xmlns:a16="http://schemas.microsoft.com/office/drawing/2014/main" id="{AFFC4B18-B954-46F5-AB56-6296F0EFC9BC}"/>
+              <a:t> Modelos</a:t>
+            </a:r>
+          </a:p>
+        </p:txBody>
+      </p:sp>
+      <p:sp>
+        <p:nvSpPr>
+          <p:cNvPr id="58" name="Rectángulo 57">
+            <a:extLst>
+              <a:ext uri="{FF2B5EF4-FFF2-40B4-BE49-F238E27FC236}">
+                <a16:creationId xmlns:a16="http://schemas.microsoft.com/office/drawing/2014/main" id="{5D3AB62B-1D77-43D5-B7BF-A0443E874595}"/>
               </a:ext>
             </a:extLst>
           </p:cNvPr>
@@ -10502,8 +10338,8 @@
         </p:nvSpPr>
         <p:spPr>
           <a:xfrm>
-            <a:off x="6865576" y="3452461"/>
-            <a:ext cx="5022471" cy="1200163"/>
+            <a:off x="6853544" y="1204631"/>
+            <a:ext cx="5022471" cy="804644"/>
           </a:xfrm>
           <a:prstGeom prst="rect">
             <a:avLst/>
@@ -10514,7 +10350,9 @@
           <a:ln>
             <a:noFill/>
           </a:ln>
-          <a:effectLst/>
+          <a:effectLst>
+            <a:softEdge rad="25400"/>
+          </a:effectLst>
         </p:spPr>
         <p:style>
           <a:lnRef idx="2">
@@ -10542,7 +10380,7 @@
             </a:r>
             <a:r>
               <a:rPr lang="es-ES" dirty="0" err="1"/>
-              <a:t>Model</a:t>
+              <a:t>Template</a:t>
             </a:r>
             <a:endParaRPr lang="es-ES" dirty="0"/>
           </a:p>
@@ -10550,10 +10388,10 @@
       </p:sp>
       <p:sp>
         <p:nvSpPr>
-          <p:cNvPr id="66" name="Rectángulo 65">
-            <a:extLst>
-              <a:ext uri="{FF2B5EF4-FFF2-40B4-BE49-F238E27FC236}">
-                <a16:creationId xmlns:a16="http://schemas.microsoft.com/office/drawing/2014/main" id="{DE7203EF-17B6-43EE-8FDF-7386D238F0E7}"/>
+          <p:cNvPr id="59" name="Rectángulo 58">
+            <a:extLst>
+              <a:ext uri="{FF2B5EF4-FFF2-40B4-BE49-F238E27FC236}">
+                <a16:creationId xmlns:a16="http://schemas.microsoft.com/office/drawing/2014/main" id="{30D42AEB-BF36-422F-91A4-A65027841CF2}"/>
               </a:ext>
             </a:extLst>
           </p:cNvPr>
@@ -10562,12 +10400,15 @@
         </p:nvSpPr>
         <p:spPr>
           <a:xfrm>
-            <a:off x="8410969" y="4749732"/>
-            <a:ext cx="3246989" cy="361632"/>
+            <a:off x="8399577" y="1338543"/>
+            <a:ext cx="3246989" cy="553660"/>
           </a:xfrm>
           <a:prstGeom prst="rect">
             <a:avLst/>
           </a:prstGeom>
+          <a:effectLst>
+            <a:softEdge rad="25400"/>
+          </a:effectLst>
         </p:spPr>
         <p:style>
           <a:lnRef idx="2">
@@ -10591,18 +10432,22 @@
           <a:p>
             <a:pPr algn="ctr"/>
             <a:r>
+              <a:rPr lang="es-ES" dirty="0" err="1"/>
+              <a:t>Serializers</a:t>
+            </a:r>
+            <a:r>
               <a:rPr lang="es-ES" dirty="0"/>
-              <a:t>Gestión de errores</a:t>
-            </a:r>
-          </a:p>
-        </p:txBody>
-      </p:sp>
-      <p:sp>
-        <p:nvSpPr>
-          <p:cNvPr id="67" name="Rectángulo 66">
-            <a:extLst>
-              <a:ext uri="{FF2B5EF4-FFF2-40B4-BE49-F238E27FC236}">
-                <a16:creationId xmlns:a16="http://schemas.microsoft.com/office/drawing/2014/main" id="{7BC96A7D-AE98-4315-ADE3-9DC231C605EE}"/>
+              <a:t> (Contratos Modelo y validaciones)</a:t>
+            </a:r>
+          </a:p>
+        </p:txBody>
+      </p:sp>
+      <p:sp>
+        <p:nvSpPr>
+          <p:cNvPr id="60" name="Rectángulo 59">
+            <a:extLst>
+              <a:ext uri="{FF2B5EF4-FFF2-40B4-BE49-F238E27FC236}">
+                <a16:creationId xmlns:a16="http://schemas.microsoft.com/office/drawing/2014/main" id="{76D252E6-29C3-4359-AA63-38F050374E17}"/>
               </a:ext>
             </a:extLst>
           </p:cNvPr>
@@ -10611,12 +10456,21 @@
         </p:nvSpPr>
         <p:spPr>
           <a:xfrm>
-            <a:off x="8410969" y="5205292"/>
-            <a:ext cx="3246989" cy="361632"/>
+            <a:off x="6880310" y="2082858"/>
+            <a:ext cx="5022471" cy="1283026"/>
           </a:xfrm>
           <a:prstGeom prst="rect">
             <a:avLst/>
           </a:prstGeom>
+          <a:solidFill>
+            <a:schemeClr val="tx1"/>
+          </a:solidFill>
+          <a:ln>
+            <a:noFill/>
+          </a:ln>
+          <a:effectLst>
+            <a:softEdge rad="25400"/>
+          </a:effectLst>
         </p:spPr>
         <p:style>
           <a:lnRef idx="2">
@@ -10638,6 +10492,281 @@
           <a:bodyPr rtlCol="0" anchor="ctr"/>
           <a:lstStyle/>
           <a:p>
+            <a:r>
+              <a:rPr lang="es-ES" dirty="0"/>
+              <a:t>  View</a:t>
+            </a:r>
+          </a:p>
+        </p:txBody>
+      </p:sp>
+      <p:sp>
+        <p:nvSpPr>
+          <p:cNvPr id="61" name="Rectángulo 60">
+            <a:extLst>
+              <a:ext uri="{FF2B5EF4-FFF2-40B4-BE49-F238E27FC236}">
+                <a16:creationId xmlns:a16="http://schemas.microsoft.com/office/drawing/2014/main" id="{198F6D9A-057C-4A53-A024-BC69DA908F25}"/>
+              </a:ext>
+            </a:extLst>
+          </p:cNvPr>
+          <p:cNvSpPr/>
+          <p:nvPr/>
+        </p:nvSpPr>
+        <p:spPr>
+          <a:xfrm>
+            <a:off x="8399578" y="2271503"/>
+            <a:ext cx="3246989" cy="361632"/>
+          </a:xfrm>
+          <a:prstGeom prst="rect">
+            <a:avLst/>
+          </a:prstGeom>
+          <a:effectLst>
+            <a:glow rad="139700">
+              <a:schemeClr val="accent3">
+                <a:satMod val="175000"/>
+                <a:alpha val="40000"/>
+              </a:schemeClr>
+            </a:glow>
+            <a:softEdge rad="25400"/>
+          </a:effectLst>
+        </p:spPr>
+        <p:style>
+          <a:lnRef idx="2">
+            <a:schemeClr val="accent1">
+              <a:shade val="50000"/>
+            </a:schemeClr>
+          </a:lnRef>
+          <a:fillRef idx="1">
+            <a:schemeClr val="accent1"/>
+          </a:fillRef>
+          <a:effectRef idx="0">
+            <a:schemeClr val="accent1"/>
+          </a:effectRef>
+          <a:fontRef idx="minor">
+            <a:schemeClr val="lt1"/>
+          </a:fontRef>
+        </p:style>
+        <p:txBody>
+          <a:bodyPr rtlCol="0" anchor="ctr"/>
+          <a:lstStyle/>
+          <a:p>
+            <a:pPr algn="ctr"/>
+            <a:r>
+              <a:rPr lang="es-ES" dirty="0"/>
+              <a:t>Lógica de negocio</a:t>
+            </a:r>
+          </a:p>
+        </p:txBody>
+      </p:sp>
+      <p:sp>
+        <p:nvSpPr>
+          <p:cNvPr id="62" name="Rectángulo 61">
+            <a:extLst>
+              <a:ext uri="{FF2B5EF4-FFF2-40B4-BE49-F238E27FC236}">
+                <a16:creationId xmlns:a16="http://schemas.microsoft.com/office/drawing/2014/main" id="{B0842A79-0103-4343-8E50-A166BC851206}"/>
+              </a:ext>
+            </a:extLst>
+          </p:cNvPr>
+          <p:cNvSpPr/>
+          <p:nvPr/>
+        </p:nvSpPr>
+        <p:spPr>
+          <a:xfrm>
+            <a:off x="8399577" y="2797964"/>
+            <a:ext cx="3246989" cy="361632"/>
+          </a:xfrm>
+          <a:prstGeom prst="rect">
+            <a:avLst/>
+          </a:prstGeom>
+          <a:effectLst>
+            <a:softEdge rad="25400"/>
+          </a:effectLst>
+        </p:spPr>
+        <p:style>
+          <a:lnRef idx="2">
+            <a:schemeClr val="accent1">
+              <a:shade val="50000"/>
+            </a:schemeClr>
+          </a:lnRef>
+          <a:fillRef idx="1">
+            <a:schemeClr val="accent1"/>
+          </a:fillRef>
+          <a:effectRef idx="0">
+            <a:schemeClr val="accent1"/>
+          </a:effectRef>
+          <a:fontRef idx="minor">
+            <a:schemeClr val="lt1"/>
+          </a:fontRef>
+        </p:style>
+        <p:txBody>
+          <a:bodyPr rtlCol="0" anchor="ctr"/>
+          <a:lstStyle/>
+          <a:p>
+            <a:pPr algn="ctr"/>
+            <a:r>
+              <a:rPr lang="es-ES" dirty="0"/>
+              <a:t>Contratos (verbos)</a:t>
+            </a:r>
+          </a:p>
+        </p:txBody>
+      </p:sp>
+      <p:sp>
+        <p:nvSpPr>
+          <p:cNvPr id="63" name="Rectángulo 62">
+            <a:extLst>
+              <a:ext uri="{FF2B5EF4-FFF2-40B4-BE49-F238E27FC236}">
+                <a16:creationId xmlns:a16="http://schemas.microsoft.com/office/drawing/2014/main" id="{AFFC4B18-B954-46F5-AB56-6296F0EFC9BC}"/>
+              </a:ext>
+            </a:extLst>
+          </p:cNvPr>
+          <p:cNvSpPr/>
+          <p:nvPr/>
+        </p:nvSpPr>
+        <p:spPr>
+          <a:xfrm>
+            <a:off x="6865576" y="3452461"/>
+            <a:ext cx="5022471" cy="1200163"/>
+          </a:xfrm>
+          <a:prstGeom prst="rect">
+            <a:avLst/>
+          </a:prstGeom>
+          <a:solidFill>
+            <a:schemeClr val="tx1"/>
+          </a:solidFill>
+          <a:ln>
+            <a:noFill/>
+          </a:ln>
+          <a:effectLst>
+            <a:softEdge rad="25400"/>
+          </a:effectLst>
+        </p:spPr>
+        <p:style>
+          <a:lnRef idx="2">
+            <a:schemeClr val="accent1">
+              <a:shade val="50000"/>
+            </a:schemeClr>
+          </a:lnRef>
+          <a:fillRef idx="1">
+            <a:schemeClr val="accent1"/>
+          </a:fillRef>
+          <a:effectRef idx="0">
+            <a:schemeClr val="accent1"/>
+          </a:effectRef>
+          <a:fontRef idx="minor">
+            <a:schemeClr val="lt1"/>
+          </a:fontRef>
+        </p:style>
+        <p:txBody>
+          <a:bodyPr rtlCol="0" anchor="ctr"/>
+          <a:lstStyle/>
+          <a:p>
+            <a:r>
+              <a:rPr lang="es-ES" dirty="0"/>
+              <a:t>  </a:t>
+            </a:r>
+            <a:r>
+              <a:rPr lang="es-ES" dirty="0" err="1"/>
+              <a:t>Model</a:t>
+            </a:r>
+            <a:endParaRPr lang="es-ES" dirty="0"/>
+          </a:p>
+        </p:txBody>
+      </p:sp>
+      <p:sp>
+        <p:nvSpPr>
+          <p:cNvPr id="66" name="Rectángulo 65">
+            <a:extLst>
+              <a:ext uri="{FF2B5EF4-FFF2-40B4-BE49-F238E27FC236}">
+                <a16:creationId xmlns:a16="http://schemas.microsoft.com/office/drawing/2014/main" id="{DE7203EF-17B6-43EE-8FDF-7386D238F0E7}"/>
+              </a:ext>
+            </a:extLst>
+          </p:cNvPr>
+          <p:cNvSpPr/>
+          <p:nvPr/>
+        </p:nvSpPr>
+        <p:spPr>
+          <a:xfrm>
+            <a:off x="8410969" y="4749732"/>
+            <a:ext cx="3246989" cy="361632"/>
+          </a:xfrm>
+          <a:prstGeom prst="rect">
+            <a:avLst/>
+          </a:prstGeom>
+          <a:effectLst>
+            <a:softEdge rad="25400"/>
+          </a:effectLst>
+        </p:spPr>
+        <p:style>
+          <a:lnRef idx="2">
+            <a:schemeClr val="accent1">
+              <a:shade val="50000"/>
+            </a:schemeClr>
+          </a:lnRef>
+          <a:fillRef idx="1">
+            <a:schemeClr val="accent1"/>
+          </a:fillRef>
+          <a:effectRef idx="0">
+            <a:schemeClr val="accent1"/>
+          </a:effectRef>
+          <a:fontRef idx="minor">
+            <a:schemeClr val="lt1"/>
+          </a:fontRef>
+        </p:style>
+        <p:txBody>
+          <a:bodyPr rtlCol="0" anchor="ctr"/>
+          <a:lstStyle/>
+          <a:p>
+            <a:pPr algn="ctr"/>
+            <a:r>
+              <a:rPr lang="es-ES" dirty="0"/>
+              <a:t>Gestión de errores</a:t>
+            </a:r>
+          </a:p>
+        </p:txBody>
+      </p:sp>
+      <p:sp>
+        <p:nvSpPr>
+          <p:cNvPr id="67" name="Rectángulo 66">
+            <a:extLst>
+              <a:ext uri="{FF2B5EF4-FFF2-40B4-BE49-F238E27FC236}">
+                <a16:creationId xmlns:a16="http://schemas.microsoft.com/office/drawing/2014/main" id="{7BC96A7D-AE98-4315-ADE3-9DC231C605EE}"/>
+              </a:ext>
+            </a:extLst>
+          </p:cNvPr>
+          <p:cNvSpPr/>
+          <p:nvPr/>
+        </p:nvSpPr>
+        <p:spPr>
+          <a:xfrm>
+            <a:off x="8410969" y="5205292"/>
+            <a:ext cx="3246989" cy="361632"/>
+          </a:xfrm>
+          <a:prstGeom prst="rect">
+            <a:avLst/>
+          </a:prstGeom>
+          <a:effectLst>
+            <a:softEdge rad="25400"/>
+          </a:effectLst>
+        </p:spPr>
+        <p:style>
+          <a:lnRef idx="2">
+            <a:schemeClr val="accent1">
+              <a:shade val="50000"/>
+            </a:schemeClr>
+          </a:lnRef>
+          <a:fillRef idx="1">
+            <a:schemeClr val="accent1"/>
+          </a:fillRef>
+          <a:effectRef idx="0">
+            <a:schemeClr val="accent1"/>
+          </a:effectRef>
+          <a:fontRef idx="minor">
+            <a:schemeClr val="lt1"/>
+          </a:fontRef>
+        </p:style>
+        <p:txBody>
+          <a:bodyPr rtlCol="0" anchor="ctr"/>
+          <a:lstStyle/>
+          <a:p>
             <a:pPr algn="ctr"/>
             <a:r>
               <a:rPr lang="es-ES" dirty="0"/>
@@ -10666,6 +10795,9 @@
           <a:prstGeom prst="rect">
             <a:avLst/>
           </a:prstGeom>
+          <a:effectLst>
+            <a:softEdge rad="25400"/>
+          </a:effectLst>
         </p:spPr>
         <p:style>
           <a:lnRef idx="2">
@@ -10852,12 +10984,14 @@
             <a:avLst/>
           </a:prstGeom>
           <a:solidFill>
-            <a:srgbClr val="C40000"/>
+            <a:srgbClr val="8E0000"/>
           </a:solidFill>
           <a:ln>
             <a:noFill/>
           </a:ln>
-          <a:effectLst/>
+          <a:effectLst>
+            <a:softEdge rad="25400"/>
+          </a:effectLst>
         </p:spPr>
         <p:style>
           <a:lnRef idx="1">
@@ -10914,12 +11048,14 @@
             <a:avLst/>
           </a:prstGeom>
           <a:solidFill>
-            <a:srgbClr val="C40000"/>
+            <a:srgbClr val="8E0000"/>
           </a:solidFill>
           <a:ln>
             <a:noFill/>
           </a:ln>
-          <a:effectLst/>
+          <a:effectLst>
+            <a:softEdge rad="25400"/>
+          </a:effectLst>
         </p:spPr>
         <p:style>
           <a:lnRef idx="1">
@@ -10973,6 +11109,9 @@
           <a:solidFill>
             <a:srgbClr val="294983"/>
           </a:solidFill>
+          <a:effectLst>
+            <a:softEdge rad="25400"/>
+          </a:effectLst>
         </p:spPr>
         <p:style>
           <a:lnRef idx="2">
@@ -11062,7 +11201,9 @@
           <a:ln>
             <a:noFill/>
           </a:ln>
-          <a:effectLst/>
+          <a:effectLst>
+            <a:softEdge rad="25400"/>
+          </a:effectLst>
         </p:spPr>
         <p:style>
           <a:lnRef idx="2">
@@ -11117,7 +11258,9 @@
           <a:ln>
             <a:noFill/>
           </a:ln>
-          <a:effectLst/>
+          <a:effectLst>
+            <a:softEdge rad="25400"/>
+          </a:effectLst>
         </p:spPr>
         <p:style>
           <a:lnRef idx="1">
@@ -11175,7 +11318,9 @@
           <a:ln>
             <a:noFill/>
           </a:ln>
-          <a:effectLst/>
+          <a:effectLst>
+            <a:softEdge rad="25400"/>
+          </a:effectLst>
         </p:spPr>
         <p:style>
           <a:lnRef idx="1">
@@ -11238,7 +11383,9 @@
           <a:ln>
             <a:noFill/>
           </a:ln>
-          <a:effectLst/>
+          <a:effectLst>
+            <a:softEdge rad="25400"/>
+          </a:effectLst>
         </p:spPr>
         <p:style>
           <a:lnRef idx="1">
@@ -11296,7 +11443,9 @@
           <a:ln>
             <a:noFill/>
           </a:ln>
-          <a:effectLst/>
+          <a:effectLst>
+            <a:softEdge rad="25400"/>
+          </a:effectLst>
         </p:spPr>
         <p:style>
           <a:lnRef idx="1">
@@ -11349,12 +11498,14 @@
             <a:avLst/>
           </a:prstGeom>
           <a:solidFill>
-            <a:srgbClr val="C40000"/>
+            <a:srgbClr val="8E0000"/>
           </a:solidFill>
           <a:ln>
             <a:noFill/>
           </a:ln>
-          <a:effectLst/>
+          <a:effectLst>
+            <a:softEdge rad="25400"/>
+          </a:effectLst>
         </p:spPr>
         <p:style>
           <a:lnRef idx="1">
@@ -11416,7 +11567,9 @@
           <a:ln>
             <a:noFill/>
           </a:ln>
-          <a:effectLst/>
+          <a:effectLst>
+            <a:softEdge rad="25400"/>
+          </a:effectLst>
         </p:spPr>
         <p:style>
           <a:lnRef idx="2">
@@ -11471,7 +11624,9 @@
           <a:ln>
             <a:noFill/>
           </a:ln>
-          <a:effectLst/>
+          <a:effectLst>
+            <a:softEdge rad="25400"/>
+          </a:effectLst>
         </p:spPr>
         <p:style>
           <a:lnRef idx="1">
@@ -11529,7 +11684,9 @@
           <a:ln>
             <a:noFill/>
           </a:ln>
-          <a:effectLst/>
+          <a:effectLst>
+            <a:softEdge rad="25400"/>
+          </a:effectLst>
         </p:spPr>
         <p:style>
           <a:lnRef idx="2">
@@ -11552,7 +11709,7 @@
           <a:lstStyle/>
           <a:p>
             <a:r>
-              <a:rPr lang="en-US" dirty="0" err="1"/>
+              <a:rPr lang="en-US"/>
               <a:t>Implementación</a:t>
             </a:r>
             <a:endParaRPr lang="es-ES" dirty="0"/>
@@ -11592,6 +11749,7 @@
                 <a:alpha val="40000"/>
               </a:schemeClr>
             </a:glow>
+            <a:softEdge rad="25400"/>
           </a:effectLst>
         </p:spPr>
         <p:style>
@@ -11650,7 +11808,9 @@
           <a:ln>
             <a:noFill/>
           </a:ln>
-          <a:effectLst/>
+          <a:effectLst>
+            <a:softEdge rad="25400"/>
+          </a:effectLst>
         </p:spPr>
         <p:style>
           <a:lnRef idx="2">
@@ -11712,6 +11872,7 @@
                 <a:alpha val="40000"/>
               </a:schemeClr>
             </a:glow>
+            <a:softEdge rad="25400"/>
           </a:effectLst>
         </p:spPr>
         <p:style>
@@ -11785,6 +11946,7 @@
                 <a:alpha val="40000"/>
               </a:schemeClr>
             </a:glow>
+            <a:softEdge rad="25400"/>
           </a:effectLst>
         </p:spPr>
         <p:style>
@@ -11843,333 +12005,8 @@
           <a:ln>
             <a:noFill/>
           </a:ln>
-          <a:effectLst/>
-        </p:spPr>
-        <p:style>
-          <a:lnRef idx="2">
-            <a:schemeClr val="accent1">
-              <a:shade val="50000"/>
-            </a:schemeClr>
-          </a:lnRef>
-          <a:fillRef idx="1">
-            <a:schemeClr val="accent1"/>
-          </a:fillRef>
-          <a:effectRef idx="0">
-            <a:schemeClr val="accent1"/>
-          </a:effectRef>
-          <a:fontRef idx="minor">
-            <a:schemeClr val="lt1"/>
-          </a:fontRef>
-        </p:style>
-        <p:txBody>
-          <a:bodyPr rtlCol="0" anchor="ctr"/>
-          <a:lstStyle/>
-          <a:p>
-            <a:r>
-              <a:rPr lang="es-ES" dirty="0"/>
-              <a:t>  </a:t>
-            </a:r>
-            <a:r>
-              <a:rPr lang="es-ES" dirty="0" err="1"/>
-              <a:t>Template</a:t>
-            </a:r>
-            <a:endParaRPr lang="es-ES" dirty="0"/>
-          </a:p>
-        </p:txBody>
-      </p:sp>
-      <p:sp>
-        <p:nvSpPr>
-          <p:cNvPr id="59" name="Rectángulo 58">
-            <a:extLst>
-              <a:ext uri="{FF2B5EF4-FFF2-40B4-BE49-F238E27FC236}">
-                <a16:creationId xmlns:a16="http://schemas.microsoft.com/office/drawing/2014/main" id="{30D42AEB-BF36-422F-91A4-A65027841CF2}"/>
-              </a:ext>
-            </a:extLst>
-          </p:cNvPr>
-          <p:cNvSpPr/>
-          <p:nvPr/>
-        </p:nvSpPr>
-        <p:spPr>
-          <a:xfrm>
-            <a:off x="8399577" y="1338543"/>
-            <a:ext cx="3246989" cy="553660"/>
-          </a:xfrm>
-          <a:prstGeom prst="rect">
-            <a:avLst/>
-          </a:prstGeom>
-        </p:spPr>
-        <p:style>
-          <a:lnRef idx="2">
-            <a:schemeClr val="accent1">
-              <a:shade val="50000"/>
-            </a:schemeClr>
-          </a:lnRef>
-          <a:fillRef idx="1">
-            <a:schemeClr val="accent1"/>
-          </a:fillRef>
-          <a:effectRef idx="0">
-            <a:schemeClr val="accent1"/>
-          </a:effectRef>
-          <a:fontRef idx="minor">
-            <a:schemeClr val="lt1"/>
-          </a:fontRef>
-        </p:style>
-        <p:txBody>
-          <a:bodyPr rtlCol="0" anchor="ctr"/>
-          <a:lstStyle/>
-          <a:p>
-            <a:pPr algn="ctr"/>
-            <a:r>
-              <a:rPr lang="es-ES" dirty="0" err="1"/>
-              <a:t>Serializers</a:t>
-            </a:r>
-            <a:r>
-              <a:rPr lang="es-ES" dirty="0"/>
-              <a:t> (Contratos Modelo y validaciones)</a:t>
-            </a:r>
-          </a:p>
-        </p:txBody>
-      </p:sp>
-      <p:sp>
-        <p:nvSpPr>
-          <p:cNvPr id="60" name="Rectángulo 59">
-            <a:extLst>
-              <a:ext uri="{FF2B5EF4-FFF2-40B4-BE49-F238E27FC236}">
-                <a16:creationId xmlns:a16="http://schemas.microsoft.com/office/drawing/2014/main" id="{76D252E6-29C3-4359-AA63-38F050374E17}"/>
-              </a:ext>
-            </a:extLst>
-          </p:cNvPr>
-          <p:cNvSpPr/>
-          <p:nvPr/>
-        </p:nvSpPr>
-        <p:spPr>
-          <a:xfrm>
-            <a:off x="6880310" y="2082858"/>
-            <a:ext cx="5022471" cy="1283026"/>
-          </a:xfrm>
-          <a:prstGeom prst="rect">
-            <a:avLst/>
-          </a:prstGeom>
-          <a:solidFill>
-            <a:schemeClr val="tx1"/>
-          </a:solidFill>
-          <a:ln>
-            <a:noFill/>
-          </a:ln>
-          <a:effectLst/>
-        </p:spPr>
-        <p:style>
-          <a:lnRef idx="2">
-            <a:schemeClr val="accent1">
-              <a:shade val="50000"/>
-            </a:schemeClr>
-          </a:lnRef>
-          <a:fillRef idx="1">
-            <a:schemeClr val="accent1"/>
-          </a:fillRef>
-          <a:effectRef idx="0">
-            <a:schemeClr val="accent1"/>
-          </a:effectRef>
-          <a:fontRef idx="minor">
-            <a:schemeClr val="lt1"/>
-          </a:fontRef>
-        </p:style>
-        <p:txBody>
-          <a:bodyPr rtlCol="0" anchor="ctr"/>
-          <a:lstStyle/>
-          <a:p>
-            <a:r>
-              <a:rPr lang="es-ES" dirty="0"/>
-              <a:t>  View</a:t>
-            </a:r>
-          </a:p>
-        </p:txBody>
-      </p:sp>
-      <p:sp>
-        <p:nvSpPr>
-          <p:cNvPr id="61" name="Rectángulo 60">
-            <a:extLst>
-              <a:ext uri="{FF2B5EF4-FFF2-40B4-BE49-F238E27FC236}">
-                <a16:creationId xmlns:a16="http://schemas.microsoft.com/office/drawing/2014/main" id="{198F6D9A-057C-4A53-A024-BC69DA908F25}"/>
-              </a:ext>
-            </a:extLst>
-          </p:cNvPr>
-          <p:cNvSpPr/>
-          <p:nvPr/>
-        </p:nvSpPr>
-        <p:spPr>
-          <a:xfrm>
-            <a:off x="8399578" y="2271503"/>
-            <a:ext cx="3246989" cy="361632"/>
-          </a:xfrm>
-          <a:prstGeom prst="rect">
-            <a:avLst/>
-          </a:prstGeom>
-        </p:spPr>
-        <p:style>
-          <a:lnRef idx="2">
-            <a:schemeClr val="accent1">
-              <a:shade val="50000"/>
-            </a:schemeClr>
-          </a:lnRef>
-          <a:fillRef idx="1">
-            <a:schemeClr val="accent1"/>
-          </a:fillRef>
-          <a:effectRef idx="0">
-            <a:schemeClr val="accent1"/>
-          </a:effectRef>
-          <a:fontRef idx="minor">
-            <a:schemeClr val="lt1"/>
-          </a:fontRef>
-        </p:style>
-        <p:txBody>
-          <a:bodyPr rtlCol="0" anchor="ctr"/>
-          <a:lstStyle/>
-          <a:p>
-            <a:pPr algn="ctr"/>
-            <a:r>
-              <a:rPr lang="es-ES" dirty="0"/>
-              <a:t>Lógica de negocio</a:t>
-            </a:r>
-          </a:p>
-        </p:txBody>
-      </p:sp>
-      <p:sp>
-        <p:nvSpPr>
-          <p:cNvPr id="62" name="Rectángulo 61">
-            <a:extLst>
-              <a:ext uri="{FF2B5EF4-FFF2-40B4-BE49-F238E27FC236}">
-                <a16:creationId xmlns:a16="http://schemas.microsoft.com/office/drawing/2014/main" id="{B0842A79-0103-4343-8E50-A166BC851206}"/>
-              </a:ext>
-            </a:extLst>
-          </p:cNvPr>
-          <p:cNvSpPr/>
-          <p:nvPr/>
-        </p:nvSpPr>
-        <p:spPr>
-          <a:xfrm>
-            <a:off x="8399577" y="2797964"/>
-            <a:ext cx="3246989" cy="361632"/>
-          </a:xfrm>
-          <a:prstGeom prst="rect">
-            <a:avLst/>
-          </a:prstGeom>
-        </p:spPr>
-        <p:style>
-          <a:lnRef idx="2">
-            <a:schemeClr val="accent1">
-              <a:shade val="50000"/>
-            </a:schemeClr>
-          </a:lnRef>
-          <a:fillRef idx="1">
-            <a:schemeClr val="accent1"/>
-          </a:fillRef>
-          <a:effectRef idx="0">
-            <a:schemeClr val="accent1"/>
-          </a:effectRef>
-          <a:fontRef idx="minor">
-            <a:schemeClr val="lt1"/>
-          </a:fontRef>
-        </p:style>
-        <p:txBody>
-          <a:bodyPr rtlCol="0" anchor="ctr"/>
-          <a:lstStyle/>
-          <a:p>
-            <a:pPr algn="ctr"/>
-            <a:r>
-              <a:rPr lang="es-ES" dirty="0"/>
-              <a:t>Contratos (verbos)</a:t>
-            </a:r>
-          </a:p>
-        </p:txBody>
-      </p:sp>
-      <p:sp>
-        <p:nvSpPr>
-          <p:cNvPr id="63" name="Rectángulo 62">
-            <a:extLst>
-              <a:ext uri="{FF2B5EF4-FFF2-40B4-BE49-F238E27FC236}">
-                <a16:creationId xmlns:a16="http://schemas.microsoft.com/office/drawing/2014/main" id="{AFFC4B18-B954-46F5-AB56-6296F0EFC9BC}"/>
-              </a:ext>
-            </a:extLst>
-          </p:cNvPr>
-          <p:cNvSpPr/>
-          <p:nvPr/>
-        </p:nvSpPr>
-        <p:spPr>
-          <a:xfrm>
-            <a:off x="6865576" y="3452461"/>
-            <a:ext cx="5022471" cy="1200163"/>
-          </a:xfrm>
-          <a:prstGeom prst="rect">
-            <a:avLst/>
-          </a:prstGeom>
-          <a:solidFill>
-            <a:schemeClr val="tx1"/>
-          </a:solidFill>
-          <a:ln>
-            <a:noFill/>
-          </a:ln>
-          <a:effectLst/>
-        </p:spPr>
-        <p:style>
-          <a:lnRef idx="2">
-            <a:schemeClr val="accent1">
-              <a:shade val="50000"/>
-            </a:schemeClr>
-          </a:lnRef>
-          <a:fillRef idx="1">
-            <a:schemeClr val="accent1"/>
-          </a:fillRef>
-          <a:effectRef idx="0">
-            <a:schemeClr val="accent1"/>
-          </a:effectRef>
-          <a:fontRef idx="minor">
-            <a:schemeClr val="lt1"/>
-          </a:fontRef>
-        </p:style>
-        <p:txBody>
-          <a:bodyPr rtlCol="0" anchor="ctr"/>
-          <a:lstStyle/>
-          <a:p>
-            <a:r>
-              <a:rPr lang="es-ES" dirty="0"/>
-              <a:t>  </a:t>
-            </a:r>
-            <a:r>
-              <a:rPr lang="es-ES" dirty="0" err="1"/>
-              <a:t>Model</a:t>
-            </a:r>
-            <a:endParaRPr lang="es-ES" dirty="0"/>
-          </a:p>
-        </p:txBody>
-      </p:sp>
-      <p:sp>
-        <p:nvSpPr>
-          <p:cNvPr id="64" name="Rectángulo 63">
-            <a:extLst>
-              <a:ext uri="{FF2B5EF4-FFF2-40B4-BE49-F238E27FC236}">
-                <a16:creationId xmlns:a16="http://schemas.microsoft.com/office/drawing/2014/main" id="{9660A309-B6C3-4643-9EF0-88AF28D09A8A}"/>
-              </a:ext>
-            </a:extLst>
-          </p:cNvPr>
-          <p:cNvSpPr/>
-          <p:nvPr/>
-        </p:nvSpPr>
-        <p:spPr>
-          <a:xfrm>
-            <a:off x="8399577" y="3614361"/>
-            <a:ext cx="3246989" cy="361632"/>
-          </a:xfrm>
-          <a:prstGeom prst="rect">
-            <a:avLst/>
-          </a:prstGeom>
           <a:effectLst>
-            <a:glow rad="139700">
-              <a:schemeClr val="accent3">
-                <a:satMod val="175000"/>
-                <a:alpha val="40000"/>
-              </a:schemeClr>
-            </a:glow>
+            <a:softEdge rad="25400"/>
           </a:effectLst>
         </p:spPr>
         <p:style>
@@ -12192,20 +12029,24 @@
           <a:bodyPr rtlCol="0" anchor="ctr"/>
           <a:lstStyle/>
           <a:p>
-            <a:pPr algn="ctr"/>
             <a:r>
               <a:rPr lang="es-ES" dirty="0"/>
-              <a:t>Modelos de BD (con mapeos)</a:t>
-            </a:r>
-          </a:p>
-        </p:txBody>
-      </p:sp>
-      <p:sp>
-        <p:nvSpPr>
-          <p:cNvPr id="65" name="Rectángulo 64">
-            <a:extLst>
-              <a:ext uri="{FF2B5EF4-FFF2-40B4-BE49-F238E27FC236}">
-                <a16:creationId xmlns:a16="http://schemas.microsoft.com/office/drawing/2014/main" id="{74C0D80A-F71F-4F5F-82A8-300E2F398BF4}"/>
+              <a:t>  </a:t>
+            </a:r>
+            <a:r>
+              <a:rPr lang="es-ES" dirty="0" err="1"/>
+              <a:t>Template</a:t>
+            </a:r>
+            <a:endParaRPr lang="es-ES" dirty="0"/>
+          </a:p>
+        </p:txBody>
+      </p:sp>
+      <p:sp>
+        <p:nvSpPr>
+          <p:cNvPr id="59" name="Rectángulo 58">
+            <a:extLst>
+              <a:ext uri="{FF2B5EF4-FFF2-40B4-BE49-F238E27FC236}">
+                <a16:creationId xmlns:a16="http://schemas.microsoft.com/office/drawing/2014/main" id="{30D42AEB-BF36-422F-91A4-A65027841CF2}"/>
               </a:ext>
             </a:extLst>
           </p:cNvPr>
@@ -12214,19 +12055,14 @@
         </p:nvSpPr>
         <p:spPr>
           <a:xfrm>
-            <a:off x="8410970" y="4125587"/>
-            <a:ext cx="3246989" cy="361632"/>
+            <a:off x="8399577" y="1338543"/>
+            <a:ext cx="3246989" cy="553660"/>
           </a:xfrm>
           <a:prstGeom prst="rect">
             <a:avLst/>
           </a:prstGeom>
           <a:effectLst>
-            <a:glow rad="139700">
-              <a:schemeClr val="accent3">
-                <a:satMod val="175000"/>
-                <a:alpha val="40000"/>
-              </a:schemeClr>
-            </a:glow>
+            <a:softEdge rad="25400"/>
           </a:effectLst>
         </p:spPr>
         <p:style>
@@ -12251,18 +12087,22 @@
           <a:p>
             <a:pPr algn="ctr"/>
             <a:r>
+              <a:rPr lang="es-ES" dirty="0" err="1"/>
+              <a:t>Serializers</a:t>
+            </a:r>
+            <a:r>
               <a:rPr lang="es-ES" dirty="0"/>
-              <a:t>Migraciones</a:t>
-            </a:r>
-          </a:p>
-        </p:txBody>
-      </p:sp>
-      <p:sp>
-        <p:nvSpPr>
-          <p:cNvPr id="66" name="Rectángulo 65">
-            <a:extLst>
-              <a:ext uri="{FF2B5EF4-FFF2-40B4-BE49-F238E27FC236}">
-                <a16:creationId xmlns:a16="http://schemas.microsoft.com/office/drawing/2014/main" id="{DE7203EF-17B6-43EE-8FDF-7386D238F0E7}"/>
+              <a:t> (Contratos Modelo y validaciones)</a:t>
+            </a:r>
+          </a:p>
+        </p:txBody>
+      </p:sp>
+      <p:sp>
+        <p:nvSpPr>
+          <p:cNvPr id="60" name="Rectángulo 59">
+            <a:extLst>
+              <a:ext uri="{FF2B5EF4-FFF2-40B4-BE49-F238E27FC236}">
+                <a16:creationId xmlns:a16="http://schemas.microsoft.com/office/drawing/2014/main" id="{76D252E6-29C3-4359-AA63-38F050374E17}"/>
               </a:ext>
             </a:extLst>
           </p:cNvPr>
@@ -12271,12 +12111,21 @@
         </p:nvSpPr>
         <p:spPr>
           <a:xfrm>
-            <a:off x="8410969" y="4749732"/>
-            <a:ext cx="3246989" cy="361632"/>
+            <a:off x="6880310" y="2082858"/>
+            <a:ext cx="5022471" cy="1283026"/>
           </a:xfrm>
           <a:prstGeom prst="rect">
             <a:avLst/>
           </a:prstGeom>
+          <a:solidFill>
+            <a:schemeClr val="tx1"/>
+          </a:solidFill>
+          <a:ln>
+            <a:noFill/>
+          </a:ln>
+          <a:effectLst>
+            <a:softEdge rad="25400"/>
+          </a:effectLst>
         </p:spPr>
         <p:style>
           <a:lnRef idx="2">
@@ -12298,20 +12147,19 @@
           <a:bodyPr rtlCol="0" anchor="ctr"/>
           <a:lstStyle/>
           <a:p>
-            <a:pPr algn="ctr"/>
             <a:r>
               <a:rPr lang="es-ES" dirty="0"/>
-              <a:t>Gestión de errores</a:t>
-            </a:r>
-          </a:p>
-        </p:txBody>
-      </p:sp>
-      <p:sp>
-        <p:nvSpPr>
-          <p:cNvPr id="67" name="Rectángulo 66">
-            <a:extLst>
-              <a:ext uri="{FF2B5EF4-FFF2-40B4-BE49-F238E27FC236}">
-                <a16:creationId xmlns:a16="http://schemas.microsoft.com/office/drawing/2014/main" id="{7BC96A7D-AE98-4315-ADE3-9DC231C605EE}"/>
+              <a:t>  View</a:t>
+            </a:r>
+          </a:p>
+        </p:txBody>
+      </p:sp>
+      <p:sp>
+        <p:nvSpPr>
+          <p:cNvPr id="61" name="Rectángulo 60">
+            <a:extLst>
+              <a:ext uri="{FF2B5EF4-FFF2-40B4-BE49-F238E27FC236}">
+                <a16:creationId xmlns:a16="http://schemas.microsoft.com/office/drawing/2014/main" id="{198F6D9A-057C-4A53-A024-BC69DA908F25}"/>
               </a:ext>
             </a:extLst>
           </p:cNvPr>
@@ -12320,12 +12168,15 @@
         </p:nvSpPr>
         <p:spPr>
           <a:xfrm>
-            <a:off x="8410969" y="5205292"/>
+            <a:off x="8399578" y="2271503"/>
             <a:ext cx="3246989" cy="361632"/>
           </a:xfrm>
           <a:prstGeom prst="rect">
             <a:avLst/>
           </a:prstGeom>
+          <a:effectLst>
+            <a:softEdge rad="25400"/>
+          </a:effectLst>
         </p:spPr>
         <p:style>
           <a:lnRef idx="2">
@@ -12350,6 +12201,340 @@
             <a:pPr algn="ctr"/>
             <a:r>
               <a:rPr lang="es-ES" dirty="0"/>
+              <a:t>Lógica de negocio</a:t>
+            </a:r>
+          </a:p>
+        </p:txBody>
+      </p:sp>
+      <p:sp>
+        <p:nvSpPr>
+          <p:cNvPr id="62" name="Rectángulo 61">
+            <a:extLst>
+              <a:ext uri="{FF2B5EF4-FFF2-40B4-BE49-F238E27FC236}">
+                <a16:creationId xmlns:a16="http://schemas.microsoft.com/office/drawing/2014/main" id="{B0842A79-0103-4343-8E50-A166BC851206}"/>
+              </a:ext>
+            </a:extLst>
+          </p:cNvPr>
+          <p:cNvSpPr/>
+          <p:nvPr/>
+        </p:nvSpPr>
+        <p:spPr>
+          <a:xfrm>
+            <a:off x="8399577" y="2797964"/>
+            <a:ext cx="3246989" cy="361632"/>
+          </a:xfrm>
+          <a:prstGeom prst="rect">
+            <a:avLst/>
+          </a:prstGeom>
+          <a:effectLst>
+            <a:softEdge rad="25400"/>
+          </a:effectLst>
+        </p:spPr>
+        <p:style>
+          <a:lnRef idx="2">
+            <a:schemeClr val="accent1">
+              <a:shade val="50000"/>
+            </a:schemeClr>
+          </a:lnRef>
+          <a:fillRef idx="1">
+            <a:schemeClr val="accent1"/>
+          </a:fillRef>
+          <a:effectRef idx="0">
+            <a:schemeClr val="accent1"/>
+          </a:effectRef>
+          <a:fontRef idx="minor">
+            <a:schemeClr val="lt1"/>
+          </a:fontRef>
+        </p:style>
+        <p:txBody>
+          <a:bodyPr rtlCol="0" anchor="ctr"/>
+          <a:lstStyle/>
+          <a:p>
+            <a:pPr algn="ctr"/>
+            <a:r>
+              <a:rPr lang="es-ES" dirty="0"/>
+              <a:t>Contratos (verbos)</a:t>
+            </a:r>
+          </a:p>
+        </p:txBody>
+      </p:sp>
+      <p:sp>
+        <p:nvSpPr>
+          <p:cNvPr id="63" name="Rectángulo 62">
+            <a:extLst>
+              <a:ext uri="{FF2B5EF4-FFF2-40B4-BE49-F238E27FC236}">
+                <a16:creationId xmlns:a16="http://schemas.microsoft.com/office/drawing/2014/main" id="{AFFC4B18-B954-46F5-AB56-6296F0EFC9BC}"/>
+              </a:ext>
+            </a:extLst>
+          </p:cNvPr>
+          <p:cNvSpPr/>
+          <p:nvPr/>
+        </p:nvSpPr>
+        <p:spPr>
+          <a:xfrm>
+            <a:off x="6865576" y="3452461"/>
+            <a:ext cx="5022471" cy="1200163"/>
+          </a:xfrm>
+          <a:prstGeom prst="rect">
+            <a:avLst/>
+          </a:prstGeom>
+          <a:solidFill>
+            <a:schemeClr val="tx1"/>
+          </a:solidFill>
+          <a:ln>
+            <a:noFill/>
+          </a:ln>
+          <a:effectLst>
+            <a:softEdge rad="25400"/>
+          </a:effectLst>
+        </p:spPr>
+        <p:style>
+          <a:lnRef idx="2">
+            <a:schemeClr val="accent1">
+              <a:shade val="50000"/>
+            </a:schemeClr>
+          </a:lnRef>
+          <a:fillRef idx="1">
+            <a:schemeClr val="accent1"/>
+          </a:fillRef>
+          <a:effectRef idx="0">
+            <a:schemeClr val="accent1"/>
+          </a:effectRef>
+          <a:fontRef idx="minor">
+            <a:schemeClr val="lt1"/>
+          </a:fontRef>
+        </p:style>
+        <p:txBody>
+          <a:bodyPr rtlCol="0" anchor="ctr"/>
+          <a:lstStyle/>
+          <a:p>
+            <a:r>
+              <a:rPr lang="es-ES" dirty="0"/>
+              <a:t>  </a:t>
+            </a:r>
+            <a:r>
+              <a:rPr lang="es-ES" dirty="0" err="1"/>
+              <a:t>Model</a:t>
+            </a:r>
+            <a:endParaRPr lang="es-ES" dirty="0"/>
+          </a:p>
+        </p:txBody>
+      </p:sp>
+      <p:sp>
+        <p:nvSpPr>
+          <p:cNvPr id="64" name="Rectángulo 63">
+            <a:extLst>
+              <a:ext uri="{FF2B5EF4-FFF2-40B4-BE49-F238E27FC236}">
+                <a16:creationId xmlns:a16="http://schemas.microsoft.com/office/drawing/2014/main" id="{9660A309-B6C3-4643-9EF0-88AF28D09A8A}"/>
+              </a:ext>
+            </a:extLst>
+          </p:cNvPr>
+          <p:cNvSpPr/>
+          <p:nvPr/>
+        </p:nvSpPr>
+        <p:spPr>
+          <a:xfrm>
+            <a:off x="8399577" y="3614361"/>
+            <a:ext cx="3246989" cy="361632"/>
+          </a:xfrm>
+          <a:prstGeom prst="rect">
+            <a:avLst/>
+          </a:prstGeom>
+          <a:effectLst>
+            <a:glow rad="139700">
+              <a:schemeClr val="accent3">
+                <a:satMod val="175000"/>
+                <a:alpha val="40000"/>
+              </a:schemeClr>
+            </a:glow>
+            <a:softEdge rad="25400"/>
+          </a:effectLst>
+        </p:spPr>
+        <p:style>
+          <a:lnRef idx="2">
+            <a:schemeClr val="accent1">
+              <a:shade val="50000"/>
+            </a:schemeClr>
+          </a:lnRef>
+          <a:fillRef idx="1">
+            <a:schemeClr val="accent1"/>
+          </a:fillRef>
+          <a:effectRef idx="0">
+            <a:schemeClr val="accent1"/>
+          </a:effectRef>
+          <a:fontRef idx="minor">
+            <a:schemeClr val="lt1"/>
+          </a:fontRef>
+        </p:style>
+        <p:txBody>
+          <a:bodyPr rtlCol="0" anchor="ctr"/>
+          <a:lstStyle/>
+          <a:p>
+            <a:pPr algn="ctr"/>
+            <a:r>
+              <a:rPr lang="es-ES" dirty="0"/>
+              <a:t>Modelos de BD (con mapeos)</a:t>
+            </a:r>
+          </a:p>
+        </p:txBody>
+      </p:sp>
+      <p:sp>
+        <p:nvSpPr>
+          <p:cNvPr id="65" name="Rectángulo 64">
+            <a:extLst>
+              <a:ext uri="{FF2B5EF4-FFF2-40B4-BE49-F238E27FC236}">
+                <a16:creationId xmlns:a16="http://schemas.microsoft.com/office/drawing/2014/main" id="{74C0D80A-F71F-4F5F-82A8-300E2F398BF4}"/>
+              </a:ext>
+            </a:extLst>
+          </p:cNvPr>
+          <p:cNvSpPr/>
+          <p:nvPr/>
+        </p:nvSpPr>
+        <p:spPr>
+          <a:xfrm>
+            <a:off x="8410970" y="4125587"/>
+            <a:ext cx="3246989" cy="361632"/>
+          </a:xfrm>
+          <a:prstGeom prst="rect">
+            <a:avLst/>
+          </a:prstGeom>
+          <a:effectLst>
+            <a:glow rad="139700">
+              <a:schemeClr val="accent3">
+                <a:satMod val="175000"/>
+                <a:alpha val="40000"/>
+              </a:schemeClr>
+            </a:glow>
+            <a:softEdge rad="25400"/>
+          </a:effectLst>
+        </p:spPr>
+        <p:style>
+          <a:lnRef idx="2">
+            <a:schemeClr val="accent1">
+              <a:shade val="50000"/>
+            </a:schemeClr>
+          </a:lnRef>
+          <a:fillRef idx="1">
+            <a:schemeClr val="accent1"/>
+          </a:fillRef>
+          <a:effectRef idx="0">
+            <a:schemeClr val="accent1"/>
+          </a:effectRef>
+          <a:fontRef idx="minor">
+            <a:schemeClr val="lt1"/>
+          </a:fontRef>
+        </p:style>
+        <p:txBody>
+          <a:bodyPr rtlCol="0" anchor="ctr"/>
+          <a:lstStyle/>
+          <a:p>
+            <a:pPr algn="ctr"/>
+            <a:r>
+              <a:rPr lang="es-ES" dirty="0"/>
+              <a:t>Migraciones</a:t>
+            </a:r>
+          </a:p>
+        </p:txBody>
+      </p:sp>
+      <p:sp>
+        <p:nvSpPr>
+          <p:cNvPr id="66" name="Rectángulo 65">
+            <a:extLst>
+              <a:ext uri="{FF2B5EF4-FFF2-40B4-BE49-F238E27FC236}">
+                <a16:creationId xmlns:a16="http://schemas.microsoft.com/office/drawing/2014/main" id="{DE7203EF-17B6-43EE-8FDF-7386D238F0E7}"/>
+              </a:ext>
+            </a:extLst>
+          </p:cNvPr>
+          <p:cNvSpPr/>
+          <p:nvPr/>
+        </p:nvSpPr>
+        <p:spPr>
+          <a:xfrm>
+            <a:off x="8410969" y="4749732"/>
+            <a:ext cx="3246989" cy="361632"/>
+          </a:xfrm>
+          <a:prstGeom prst="rect">
+            <a:avLst/>
+          </a:prstGeom>
+          <a:effectLst>
+            <a:softEdge rad="25400"/>
+          </a:effectLst>
+        </p:spPr>
+        <p:style>
+          <a:lnRef idx="2">
+            <a:schemeClr val="accent1">
+              <a:shade val="50000"/>
+            </a:schemeClr>
+          </a:lnRef>
+          <a:fillRef idx="1">
+            <a:schemeClr val="accent1"/>
+          </a:fillRef>
+          <a:effectRef idx="0">
+            <a:schemeClr val="accent1"/>
+          </a:effectRef>
+          <a:fontRef idx="minor">
+            <a:schemeClr val="lt1"/>
+          </a:fontRef>
+        </p:style>
+        <p:txBody>
+          <a:bodyPr rtlCol="0" anchor="ctr"/>
+          <a:lstStyle/>
+          <a:p>
+            <a:pPr algn="ctr"/>
+            <a:r>
+              <a:rPr lang="es-ES" dirty="0"/>
+              <a:t>Gestión de errores</a:t>
+            </a:r>
+          </a:p>
+        </p:txBody>
+      </p:sp>
+      <p:sp>
+        <p:nvSpPr>
+          <p:cNvPr id="67" name="Rectángulo 66">
+            <a:extLst>
+              <a:ext uri="{FF2B5EF4-FFF2-40B4-BE49-F238E27FC236}">
+                <a16:creationId xmlns:a16="http://schemas.microsoft.com/office/drawing/2014/main" id="{7BC96A7D-AE98-4315-ADE3-9DC231C605EE}"/>
+              </a:ext>
+            </a:extLst>
+          </p:cNvPr>
+          <p:cNvSpPr/>
+          <p:nvPr/>
+        </p:nvSpPr>
+        <p:spPr>
+          <a:xfrm>
+            <a:off x="8410969" y="5205292"/>
+            <a:ext cx="3246989" cy="361632"/>
+          </a:xfrm>
+          <a:prstGeom prst="rect">
+            <a:avLst/>
+          </a:prstGeom>
+          <a:effectLst>
+            <a:softEdge rad="25400"/>
+          </a:effectLst>
+        </p:spPr>
+        <p:style>
+          <a:lnRef idx="2">
+            <a:schemeClr val="accent1">
+              <a:shade val="50000"/>
+            </a:schemeClr>
+          </a:lnRef>
+          <a:fillRef idx="1">
+            <a:schemeClr val="accent1"/>
+          </a:fillRef>
+          <a:effectRef idx="0">
+            <a:schemeClr val="accent1"/>
+          </a:effectRef>
+          <a:fontRef idx="minor">
+            <a:schemeClr val="lt1"/>
+          </a:fontRef>
+        </p:style>
+        <p:txBody>
+          <a:bodyPr rtlCol="0" anchor="ctr"/>
+          <a:lstStyle/>
+          <a:p>
+            <a:pPr algn="ctr"/>
+            <a:r>
+              <a:rPr lang="es-ES" dirty="0"/>
               <a:t>Autenticación</a:t>
             </a:r>
           </a:p>
@@ -12375,6 +12560,9 @@
           <a:prstGeom prst="rect">
             <a:avLst/>
           </a:prstGeom>
+          <a:effectLst>
+            <a:softEdge rad="25400"/>
+          </a:effectLst>
         </p:spPr>
         <p:style>
           <a:lnRef idx="2">
@@ -18699,12 +18887,14 @@
             <a:avLst/>
           </a:prstGeom>
           <a:solidFill>
-            <a:srgbClr val="C40000"/>
+            <a:srgbClr val="8E0000"/>
           </a:solidFill>
           <a:ln>
             <a:noFill/>
           </a:ln>
-          <a:effectLst/>
+          <a:effectLst>
+            <a:softEdge rad="25400"/>
+          </a:effectLst>
         </p:spPr>
         <p:style>
           <a:lnRef idx="1">
@@ -18761,12 +18951,14 @@
             <a:avLst/>
           </a:prstGeom>
           <a:solidFill>
-            <a:srgbClr val="C40000"/>
+            <a:srgbClr val="8E0000"/>
           </a:solidFill>
           <a:ln>
             <a:noFill/>
           </a:ln>
-          <a:effectLst/>
+          <a:effectLst>
+            <a:softEdge rad="25400"/>
+          </a:effectLst>
         </p:spPr>
         <p:style>
           <a:lnRef idx="1">
@@ -18820,6 +19012,9 @@
           <a:solidFill>
             <a:srgbClr val="294983"/>
           </a:solidFill>
+          <a:effectLst>
+            <a:softEdge rad="25400"/>
+          </a:effectLst>
         </p:spPr>
         <p:style>
           <a:lnRef idx="2">
@@ -18909,7 +19104,9 @@
           <a:ln>
             <a:noFill/>
           </a:ln>
-          <a:effectLst/>
+          <a:effectLst>
+            <a:softEdge rad="25400"/>
+          </a:effectLst>
         </p:spPr>
         <p:style>
           <a:lnRef idx="2">
@@ -18964,7 +19161,9 @@
           <a:ln>
             <a:noFill/>
           </a:ln>
-          <a:effectLst/>
+          <a:effectLst>
+            <a:softEdge rad="25400"/>
+          </a:effectLst>
         </p:spPr>
         <p:style>
           <a:lnRef idx="1">
@@ -19022,7 +19221,9 @@
           <a:ln>
             <a:noFill/>
           </a:ln>
-          <a:effectLst/>
+          <a:effectLst>
+            <a:softEdge rad="25400"/>
+          </a:effectLst>
         </p:spPr>
         <p:style>
           <a:lnRef idx="1">
@@ -19085,7 +19286,9 @@
           <a:ln>
             <a:noFill/>
           </a:ln>
-          <a:effectLst/>
+          <a:effectLst>
+            <a:softEdge rad="25400"/>
+          </a:effectLst>
         </p:spPr>
         <p:style>
           <a:lnRef idx="1">
@@ -19143,7 +19346,9 @@
           <a:ln>
             <a:noFill/>
           </a:ln>
-          <a:effectLst/>
+          <a:effectLst>
+            <a:softEdge rad="25400"/>
+          </a:effectLst>
         </p:spPr>
         <p:style>
           <a:lnRef idx="1">
@@ -19196,12 +19401,14 @@
             <a:avLst/>
           </a:prstGeom>
           <a:solidFill>
-            <a:srgbClr val="C40000"/>
+            <a:srgbClr val="8E0000"/>
           </a:solidFill>
           <a:ln>
             <a:noFill/>
           </a:ln>
-          <a:effectLst/>
+          <a:effectLst>
+            <a:softEdge rad="25400"/>
+          </a:effectLst>
         </p:spPr>
         <p:style>
           <a:lnRef idx="1">
@@ -19263,7 +19470,9 @@
           <a:ln>
             <a:noFill/>
           </a:ln>
-          <a:effectLst/>
+          <a:effectLst>
+            <a:softEdge rad="25400"/>
+          </a:effectLst>
         </p:spPr>
         <p:style>
           <a:lnRef idx="2">
@@ -19318,7 +19527,9 @@
           <a:ln>
             <a:noFill/>
           </a:ln>
-          <a:effectLst/>
+          <a:effectLst>
+            <a:softEdge rad="25400"/>
+          </a:effectLst>
         </p:spPr>
         <p:style>
           <a:lnRef idx="1">
@@ -19376,7 +19587,9 @@
           <a:ln>
             <a:noFill/>
           </a:ln>
-          <a:effectLst/>
+          <a:effectLst>
+            <a:softEdge rad="25400"/>
+          </a:effectLst>
         </p:spPr>
         <p:style>
           <a:lnRef idx="2">
@@ -19399,7 +19612,7 @@
           <a:lstStyle/>
           <a:p>
             <a:r>
-              <a:rPr lang="en-US" dirty="0" err="1"/>
+              <a:rPr lang="en-US"/>
               <a:t>Implementación</a:t>
             </a:r>
             <a:endParaRPr lang="es-ES" dirty="0"/>
@@ -19432,7 +19645,9 @@
           <a:ln>
             <a:noFill/>
           </a:ln>
-          <a:effectLst/>
+          <a:effectLst>
+            <a:softEdge rad="25400"/>
+          </a:effectLst>
         </p:spPr>
         <p:style>
           <a:lnRef idx="1">
@@ -19490,7 +19705,9 @@
           <a:ln>
             <a:noFill/>
           </a:ln>
-          <a:effectLst/>
+          <a:effectLst>
+            <a:softEdge rad="25400"/>
+          </a:effectLst>
         </p:spPr>
         <p:style>
           <a:lnRef idx="2">
@@ -19545,7 +19762,9 @@
           <a:ln>
             <a:noFill/>
           </a:ln>
-          <a:effectLst/>
+          <a:effectLst>
+            <a:softEdge rad="25400"/>
+          </a:effectLst>
         </p:spPr>
         <p:style>
           <a:lnRef idx="1">
@@ -19567,7 +19786,7 @@
           <a:p>
             <a:pPr algn="ctr"/>
             <a:r>
-              <a:rPr lang="es-ES" dirty="0" err="1">
+              <a:rPr lang="es-ES">
                 <a:solidFill>
                   <a:schemeClr val="bg1"/>
                 </a:solidFill>
@@ -19611,7 +19830,9 @@
           <a:ln>
             <a:noFill/>
           </a:ln>
-          <a:effectLst/>
+          <a:effectLst>
+            <a:softEdge rad="25400"/>
+          </a:effectLst>
         </p:spPr>
         <p:style>
           <a:lnRef idx="1">
@@ -19669,7 +19890,9 @@
           <a:ln>
             <a:noFill/>
           </a:ln>
-          <a:effectLst/>
+          <a:effectLst>
+            <a:softEdge rad="25400"/>
+          </a:effectLst>
         </p:spPr>
         <p:style>
           <a:lnRef idx="2">
@@ -19723,6 +19946,9 @@
           <a:prstGeom prst="rect">
             <a:avLst/>
           </a:prstGeom>
+          <a:effectLst>
+            <a:softEdge rad="25400"/>
+          </a:effectLst>
         </p:spPr>
         <p:style>
           <a:lnRef idx="2">
@@ -19782,7 +20008,9 @@
           <a:ln>
             <a:noFill/>
           </a:ln>
-          <a:effectLst/>
+          <a:effectLst>
+            <a:softEdge rad="25400"/>
+          </a:effectLst>
         </p:spPr>
         <p:style>
           <a:lnRef idx="2">
@@ -19831,6 +20059,9 @@
           <a:prstGeom prst="rect">
             <a:avLst/>
           </a:prstGeom>
+          <a:effectLst>
+            <a:softEdge rad="25400"/>
+          </a:effectLst>
         </p:spPr>
         <p:style>
           <a:lnRef idx="2">
@@ -19880,6 +20111,9 @@
           <a:prstGeom prst="rect">
             <a:avLst/>
           </a:prstGeom>
+          <a:effectLst>
+            <a:softEdge rad="25400"/>
+          </a:effectLst>
         </p:spPr>
         <p:style>
           <a:lnRef idx="2">
@@ -19935,7 +20169,9 @@
           <a:ln>
             <a:noFill/>
           </a:ln>
-          <a:effectLst/>
+          <a:effectLst>
+            <a:softEdge rad="25400"/>
+          </a:effectLst>
         </p:spPr>
         <p:style>
           <a:lnRef idx="2">
@@ -19958,12 +20194,8 @@
           <a:lstStyle/>
           <a:p>
             <a:r>
-              <a:rPr lang="es-ES" dirty="0"/>
-              <a:t>  </a:t>
-            </a:r>
-            <a:r>
-              <a:rPr lang="es-ES" dirty="0" err="1"/>
-              <a:t>Model</a:t>
+              <a:rPr lang="es-ES"/>
+              <a:t>  Model</a:t>
             </a:r>
             <a:endParaRPr lang="es-ES" dirty="0"/>
           </a:p>
@@ -19989,6 +20221,9 @@
           <a:prstGeom prst="rect">
             <a:avLst/>
           </a:prstGeom>
+          <a:effectLst>
+            <a:softEdge rad="25400"/>
+          </a:effectLst>
         </p:spPr>
         <p:style>
           <a:lnRef idx="2">
@@ -20038,6 +20273,9 @@
           <a:prstGeom prst="rect">
             <a:avLst/>
           </a:prstGeom>
+          <a:effectLst>
+            <a:softEdge rad="25400"/>
+          </a:effectLst>
         </p:spPr>
         <p:style>
           <a:lnRef idx="2">
@@ -20087,6 +20325,9 @@
           <a:prstGeom prst="rect">
             <a:avLst/>
           </a:prstGeom>
+          <a:effectLst>
+            <a:softEdge rad="25400"/>
+          </a:effectLst>
         </p:spPr>
         <p:style>
           <a:lnRef idx="2">
@@ -20136,6 +20377,9 @@
           <a:prstGeom prst="rect">
             <a:avLst/>
           </a:prstGeom>
+          <a:effectLst>
+            <a:softEdge rad="25400"/>
+          </a:effectLst>
         </p:spPr>
         <p:style>
           <a:lnRef idx="2">
@@ -20185,6 +20429,9 @@
           <a:prstGeom prst="rect">
             <a:avLst/>
           </a:prstGeom>
+          <a:effectLst>
+            <a:softEdge rad="25400"/>
+          </a:effectLst>
         </p:spPr>
         <p:style>
           <a:lnRef idx="2">
@@ -20208,12 +20455,8 @@
           <a:p>
             <a:pPr algn="ctr"/>
             <a:r>
-              <a:rPr lang="es-ES" dirty="0"/>
-              <a:t>Contratos (</a:t>
-            </a:r>
-            <a:r>
-              <a:rPr lang="es-ES" dirty="0" err="1"/>
-              <a:t>URLs</a:t>
+              <a:rPr lang="es-ES"/>
+              <a:t>Contratos (URLs</a:t>
             </a:r>
             <a:r>
               <a:rPr lang="es-ES" dirty="0"/>

</xml_diff>